<commit_message>
Presentation, will add charts tommorow morning
</commit_message>
<xml_diff>
--- a/presentations/1_final_presentation.pptx
+++ b/presentations/1_final_presentation.pptx
@@ -5,14 +5,20 @@
     <p:sldMasterId id="2147483648" r:id="rId1"/>
   </p:sldMasterIdLst>
   <p:notesMasterIdLst>
-    <p:notesMasterId r:id="rId7"/>
+    <p:notesMasterId r:id="rId13"/>
   </p:notesMasterIdLst>
   <p:sldIdLst>
     <p:sldId id="256" r:id="rId2"/>
     <p:sldId id="257" r:id="rId3"/>
     <p:sldId id="258" r:id="rId4"/>
     <p:sldId id="259" r:id="rId5"/>
-    <p:sldId id="260" r:id="rId6"/>
+    <p:sldId id="262" r:id="rId6"/>
+    <p:sldId id="261" r:id="rId7"/>
+    <p:sldId id="260" r:id="rId8"/>
+    <p:sldId id="263" r:id="rId9"/>
+    <p:sldId id="264" r:id="rId10"/>
+    <p:sldId id="265" r:id="rId11"/>
+    <p:sldId id="266" r:id="rId12"/>
   </p:sldIdLst>
   <p:sldSz cx="12192000" cy="6858000"/>
   <p:notesSz cx="6858000" cy="9144000"/>
@@ -383,286 +389,6 @@
 </p188:cmLst>
 </file>
 
-<file path=ppt/ink/ink1.xml><?xml version="1.0" encoding="utf-8"?>
-<inkml:ink xmlns:inkml="http://www.w3.org/2003/InkML">
-  <inkml:definitions>
-    <inkml:context xml:id="ctx0">
-      <inkml:inkSource xml:id="inkSrc0">
-        <inkml:traceFormat>
-          <inkml:channel name="X" type="integer" min="-2.14748E9" max="2.14748E9" units="cm"/>
-          <inkml:channel name="Y" type="integer" min="-2.14748E9" max="2.14748E9" units="cm"/>
-          <inkml:channel name="F" type="integer" max="32767" units="dev"/>
-        </inkml:traceFormat>
-        <inkml:channelProperties>
-          <inkml:channelProperty channel="X" name="resolution" value="1000" units="1/cm"/>
-          <inkml:channelProperty channel="Y" name="resolution" value="1000" units="1/cm"/>
-          <inkml:channelProperty channel="F" name="resolution" value="0" units="1/dev"/>
-        </inkml:channelProperties>
-      </inkml:inkSource>
-      <inkml:timestamp xml:id="ts0" timeString="2025-11-19T20:15:03.499"/>
-    </inkml:context>
-    <inkml:brush xml:id="br0">
-      <inkml:brushProperty name="width" value="0.05" units="cm"/>
-      <inkml:brushProperty name="height" value="0.05" units="cm"/>
-      <inkml:brushProperty name="color" value="#E71224"/>
-    </inkml:brush>
-  </inkml:definitions>
-  <inkml:trace contextRef="#ctx0" brushRef="#br0">2 1188 24575,'0'30'0,"-1"-13"0,1 1 0,4 25 0,-3-37 0,0-1 0,0 1 0,1-1 0,0 1 0,0-1 0,0 0 0,1 0 0,0 0 0,0 0 0,0-1 0,7 9 0,-7-11 0,-2 0 0,0-1 0,0 1 0,0-1 0,0 1 0,1-1 0,-1 0 0,1 0 0,-1 0 0,1 0 0,-1 0 0,1 0 0,-1 0 0,1 0 0,0 0 0,2 0 0,-3-2 0,1 0 0,0 0 0,0 0 0,-1 0 0,1 0 0,-1-1 0,1 1 0,-1 0 0,1-1 0,-1 1 0,0-1 0,0 1 0,0-1 0,0 0 0,0 0 0,0 1 0,0-1 0,0-2 0,67-132 0,10-18 0,144-177 0,28 17 0,46-61 0,-264 337-1365,-20 28-5461</inkml:trace>
-</inkml:ink>
-</file>
-
-<file path=ppt/ink/ink10.xml><?xml version="1.0" encoding="utf-8"?>
-<inkml:ink xmlns:inkml="http://www.w3.org/2003/InkML">
-  <inkml:definitions>
-    <inkml:context xml:id="ctx0">
-      <inkml:inkSource xml:id="inkSrc0">
-        <inkml:traceFormat>
-          <inkml:channel name="X" type="integer" min="-2.14748E9" max="2.14748E9" units="cm"/>
-          <inkml:channel name="Y" type="integer" min="-2.14748E9" max="2.14748E9" units="cm"/>
-          <inkml:channel name="F" type="integer" max="32767" units="dev"/>
-        </inkml:traceFormat>
-        <inkml:channelProperties>
-          <inkml:channelProperty channel="X" name="resolution" value="1000" units="1/cm"/>
-          <inkml:channelProperty channel="Y" name="resolution" value="1000" units="1/cm"/>
-          <inkml:channelProperty channel="F" name="resolution" value="0" units="1/dev"/>
-        </inkml:channelProperties>
-      </inkml:inkSource>
-      <inkml:timestamp xml:id="ts0" timeString="2025-11-20T13:24:10.773"/>
-    </inkml:context>
-    <inkml:brush xml:id="br0">
-      <inkml:brushProperty name="width" value="0.05" units="cm"/>
-      <inkml:brushProperty name="height" value="0.05" units="cm"/>
-      <inkml:brushProperty name="color" value="#E71224"/>
-    </inkml:brush>
-  </inkml:definitions>
-  <inkml:trace contextRef="#ctx0" brushRef="#br0">1 976 24575,'1'1'0,"1"0"0,-1 0 0,0-1 0,1 1 0,-1 1 0,0-1 0,0 0 0,0 0 0,0 0 0,0 1 0,0-1 0,0 0 0,0 1 0,-1-1 0,1 1 0,0-1 0,-1 1 0,1 2 0,2 3 0,14 32 0,20 79 0,-25-77 0,32 79 0,68 83 0,-60-114 0,-47-77 0,-2-6 0,0 0 0,1 1 0,-1-2 0,1 1 0,5 6 0,-8-11 0,0 0 0,-1-1 0,1 1 0,0 0 0,0-1 0,-1 1 0,1-1 0,0 1 0,0-1 0,0 1 0,0-1 0,0 0 0,-1 0 0,1 1 0,0-1 0,0 0 0,0 0 0,0 0 0,0 0 0,0 0 0,0 0 0,0 0 0,0 0 0,0 0 0,0 0 0,0-1 0,0 1 0,0 0 0,-1-1 0,1 1 0,0-1 0,0 1 0,0-1 0,0 1 0,-1-1 0,1 1 0,0-1 0,-1 0 0,1 1 0,0-1 0,-1 0 0,1 0 0,-1 0 0,1 1 0,0-3 0,15-23 0,-1-1 0,-1 0 0,-1-1 0,11-36 0,-7 21 0,487-1259-1365,-445 1152-5461</inkml:trace>
-</inkml:ink>
-</file>
-
-<file path=ppt/ink/ink2.xml><?xml version="1.0" encoding="utf-8"?>
-<inkml:ink xmlns:inkml="http://www.w3.org/2003/InkML">
-  <inkml:definitions>
-    <inkml:context xml:id="ctx0">
-      <inkml:inkSource xml:id="inkSrc0">
-        <inkml:traceFormat>
-          <inkml:channel name="X" type="integer" min="-2.14748E9" max="2.14748E9" units="cm"/>
-          <inkml:channel name="Y" type="integer" min="-2.14748E9" max="2.14748E9" units="cm"/>
-          <inkml:channel name="F" type="integer" max="32767" units="dev"/>
-        </inkml:traceFormat>
-        <inkml:channelProperties>
-          <inkml:channelProperty channel="X" name="resolution" value="1000" units="1/cm"/>
-          <inkml:channelProperty channel="Y" name="resolution" value="1000" units="1/cm"/>
-          <inkml:channelProperty channel="F" name="resolution" value="0" units="1/dev"/>
-        </inkml:channelProperties>
-      </inkml:inkSource>
-      <inkml:timestamp xml:id="ts0" timeString="2025-11-19T20:15:07.226"/>
-    </inkml:context>
-    <inkml:brush xml:id="br0">
-      <inkml:brushProperty name="width" value="0.05" units="cm"/>
-      <inkml:brushProperty name="height" value="0.05" units="cm"/>
-      <inkml:brushProperty name="color" value="#E71224"/>
-    </inkml:brush>
-  </inkml:definitions>
-  <inkml:trace contextRef="#ctx0" brushRef="#br0">0 1142 24575,'17'44'0,"10"42"0,70 194 0,-96-279 0,-1 0 0,1 0 0,0 0 0,-1 0 0,1 0 0,0 0 0,0 0 0,0 0 0,0-1 0,0 1 0,0 0 0,0 0 0,0-1 0,0 1 0,0-1 0,0 1 0,0-1 0,0 1 0,0-1 0,0 0 0,1 1 0,-1-1 0,0 0 0,0 0 0,1 0 0,-1 0 0,0 0 0,0 0 0,0 0 0,1 0 0,-1-1 0,0 1 0,0 0 0,0-1 0,2 0 0,7-3 0,1-1 0,-2 1 0,14-9 0,-12 6 0,321-220 36,-9-36-389,-264 214 110,931-793-3366,-822 692-413</inkml:trace>
-</inkml:ink>
-</file>
-
-<file path=ppt/ink/ink3.xml><?xml version="1.0" encoding="utf-8"?>
-<inkml:ink xmlns:inkml="http://www.w3.org/2003/InkML">
-  <inkml:definitions>
-    <inkml:context xml:id="ctx0">
-      <inkml:inkSource xml:id="inkSrc0">
-        <inkml:traceFormat>
-          <inkml:channel name="X" type="integer" min="-2.14748E9" max="2.14748E9" units="cm"/>
-          <inkml:channel name="Y" type="integer" min="-2.14748E9" max="2.14748E9" units="cm"/>
-          <inkml:channel name="F" type="integer" max="32767" units="dev"/>
-        </inkml:traceFormat>
-        <inkml:channelProperties>
-          <inkml:channelProperty channel="X" name="resolution" value="1000" units="1/cm"/>
-          <inkml:channelProperty channel="Y" name="resolution" value="1000" units="1/cm"/>
-          <inkml:channelProperty channel="F" name="resolution" value="0" units="1/dev"/>
-        </inkml:channelProperties>
-      </inkml:inkSource>
-      <inkml:timestamp xml:id="ts0" timeString="2025-11-19T20:15:15.116"/>
-    </inkml:context>
-    <inkml:brush xml:id="br0">
-      <inkml:brushProperty name="width" value="0.05" units="cm"/>
-      <inkml:brushProperty name="height" value="0.05" units="cm"/>
-      <inkml:brushProperty name="color" value="#E71224"/>
-    </inkml:brush>
-  </inkml:definitions>
-  <inkml:trace contextRef="#ctx0" brushRef="#br0">0 410 24575,'1'9'0,"0"0"0,1 0 0,0 0 0,1 0 0,6 15 0,3 14 0,-10-30 0,8 30 0,-2 0 0,-1 1 0,2 55 0,-7-55 0,8 45 0,-3-34 0,0-32 0,-7-18 0,0 0 0,1 0 0,-1 0 0,0 1 0,1-1 0,-1 0 0,0 0 0,1 0 0,-1 0 0,0 0 0,1 1 0,-1-1 0,0 0 0,1 0 0,-1 0 0,1 0 0,-1 0 0,0 0 0,1-1 0,-1 1 0,0 0 0,1 0 0,-1 0 0,1 0 0,-1 0 0,0 0 0,1-1 0,-1 1 0,4-3 0,-1 1 0,0-1 0,0 0 0,0 0 0,-1-1 0,1 1 0,3-7 0,35-60 0,55-134 0,-66 135 0,129-302-1365,-85 192-5461</inkml:trace>
-</inkml:ink>
-</file>
-
-<file path=ppt/ink/ink4.xml><?xml version="1.0" encoding="utf-8"?>
-<inkml:ink xmlns:inkml="http://www.w3.org/2003/InkML">
-  <inkml:definitions>
-    <inkml:context xml:id="ctx0">
-      <inkml:inkSource xml:id="inkSrc0">
-        <inkml:traceFormat>
-          <inkml:channel name="X" type="integer" min="-2.14748E9" max="2.14748E9" units="cm"/>
-          <inkml:channel name="Y" type="integer" min="-2.14748E9" max="2.14748E9" units="cm"/>
-          <inkml:channel name="F" type="integer" max="32767" units="dev"/>
-        </inkml:traceFormat>
-        <inkml:channelProperties>
-          <inkml:channelProperty channel="X" name="resolution" value="1000" units="1/cm"/>
-          <inkml:channelProperty channel="Y" name="resolution" value="1000" units="1/cm"/>
-          <inkml:channelProperty channel="F" name="resolution" value="0" units="1/dev"/>
-        </inkml:channelProperties>
-      </inkml:inkSource>
-      <inkml:timestamp xml:id="ts0" timeString="2025-11-19T20:41:03.398"/>
-    </inkml:context>
-    <inkml:brush xml:id="br0">
-      <inkml:brushProperty name="width" value="0.05" units="cm"/>
-      <inkml:brushProperty name="height" value="0.05" units="cm"/>
-      <inkml:brushProperty name="color" value="#E71224"/>
-    </inkml:brush>
-  </inkml:definitions>
-  <inkml:trace contextRef="#ctx0" brushRef="#br0">0 853 24575,'4'5'0,"-1"1"0,0-1 0,-1 0 0,1 1 0,-1 0 0,0 0 0,0 0 0,1 8 0,5 14 0,15 33 0,-3-12 0,-3 0 0,20 88 0,-37-136 0,0 1 0,0 0 0,0-1 0,1 1 0,-1-1 0,0 1 0,1-1 0,0 1 0,-1-1 0,1 0 0,0 1 0,-1-1 0,1 0 0,0 1 0,0-1 0,0 0 0,0 0 0,0 0 0,1 0 0,1 2 0,-2-3 0,0 0 0,0 0 0,0 0 0,0 0 0,0 0 0,0 0 0,1 0 0,-1 0 0,0 0 0,0 0 0,0-1 0,0 1 0,0-1 0,0 1 0,0 0 0,0-1 0,0 0 0,0 1 0,0-1 0,0 0 0,1 0 0,6-6 0,-1-1 0,1 0 0,-1 0 0,9-15 0,25-46 0,-2-1 0,33-88 0,-40 85 0,246-604 0,-239 544-1365,-34 108-5461</inkml:trace>
-</inkml:ink>
-</file>
-
-<file path=ppt/ink/ink5.xml><?xml version="1.0" encoding="utf-8"?>
-<inkml:ink xmlns:inkml="http://www.w3.org/2003/InkML">
-  <inkml:definitions>
-    <inkml:context xml:id="ctx0">
-      <inkml:inkSource xml:id="inkSrc0">
-        <inkml:traceFormat>
-          <inkml:channel name="X" type="integer" min="-2.14748E9" max="2.14748E9" units="cm"/>
-          <inkml:channel name="Y" type="integer" min="-2.14748E9" max="2.14748E9" units="cm"/>
-          <inkml:channel name="F" type="integer" max="32767" units="dev"/>
-        </inkml:traceFormat>
-        <inkml:channelProperties>
-          <inkml:channelProperty channel="X" name="resolution" value="1000" units="1/cm"/>
-          <inkml:channelProperty channel="Y" name="resolution" value="1000" units="1/cm"/>
-          <inkml:channelProperty channel="F" name="resolution" value="0" units="1/dev"/>
-        </inkml:channelProperties>
-      </inkml:inkSource>
-      <inkml:timestamp xml:id="ts0" timeString="2025-11-20T13:23:58.313"/>
-    </inkml:context>
-    <inkml:brush xml:id="br0">
-      <inkml:brushProperty name="width" value="0.05" units="cm"/>
-      <inkml:brushProperty name="height" value="0.05" units="cm"/>
-      <inkml:brushProperty name="color" value="#E71224"/>
-    </inkml:brush>
-  </inkml:definitions>
-  <inkml:trace contextRef="#ctx0" brushRef="#br0">1 1281 24575,'1'0'0,"0"1"0,0-1 0,0 0 0,0 1 0,-1-1 0,1 0 0,0 1 0,0-1 0,0 1 0,0 0 0,-1-1 0,1 1 0,0 0 0,-1-1 0,1 1 0,0 0 0,-1 0 0,1 0 0,-1-1 0,1 1 0,-1 0 0,0 0 0,1 0 0,-1 1 0,9 31 0,-5-20 0,8 20 0,31 56 0,5 9 0,-46-92 0,9 18 0,-10-24 0,-1 1 0,1-1 0,0 1 0,-1 0 0,1-1 0,-1 1 0,1-1 0,0 0 0,0 1 0,-1-1 0,1 1 0,0-1 0,0 0 0,0 0 0,-1 0 0,1 1 0,0-1 0,0 0 0,0 0 0,-1 0 0,1 0 0,0 0 0,0 0 0,0 0 0,0-1 0,-1 1 0,1 0 0,0 0 0,0-1 0,1 0 0,7-5 0,0 0 0,0-1 0,-1-1 0,0 1 0,0-1 0,-1-1 0,0 1 0,11-18 0,1 0 0,494-721 0,-273 384 0,-182 276 0,95-130 0,-145 208-227,1 0-1,-1 0 1,1 1-1,1 0 1,11-8-1,4 3-6598</inkml:trace>
-</inkml:ink>
-</file>
-
-<file path=ppt/ink/ink6.xml><?xml version="1.0" encoding="utf-8"?>
-<inkml:ink xmlns:inkml="http://www.w3.org/2003/InkML">
-  <inkml:definitions>
-    <inkml:context xml:id="ctx0">
-      <inkml:inkSource xml:id="inkSrc0">
-        <inkml:traceFormat>
-          <inkml:channel name="X" type="integer" min="-2.14748E9" max="2.14748E9" units="cm"/>
-          <inkml:channel name="Y" type="integer" min="-2.14748E9" max="2.14748E9" units="cm"/>
-          <inkml:channel name="F" type="integer" max="32767" units="dev"/>
-        </inkml:traceFormat>
-        <inkml:channelProperties>
-          <inkml:channelProperty channel="X" name="resolution" value="1000" units="1/cm"/>
-          <inkml:channelProperty channel="Y" name="resolution" value="1000" units="1/cm"/>
-          <inkml:channelProperty channel="F" name="resolution" value="0" units="1/dev"/>
-        </inkml:channelProperties>
-      </inkml:inkSource>
-      <inkml:timestamp xml:id="ts0" timeString="2025-11-20T13:24:00.767"/>
-    </inkml:context>
-    <inkml:brush xml:id="br0">
-      <inkml:brushProperty name="width" value="0.05" units="cm"/>
-      <inkml:brushProperty name="height" value="0.05" units="cm"/>
-      <inkml:brushProperty name="color" value="#E71224"/>
-    </inkml:brush>
-  </inkml:definitions>
-  <inkml:trace contextRef="#ctx0" brushRef="#br0">0 1551 24575,'10'39'0,"-6"-24"0,-1 0 0,2 0 0,6 14 0,-9-26 0,-1 0 0,1 0 0,-1 0 0,1 0 0,0 0 0,0-1 0,0 1 0,1 0 0,-1-1 0,1 0 0,-1 0 0,1 0 0,0 0 0,0 0 0,0 0 0,0-1 0,0 1 0,6 1 0,-6-3 0,0 0 0,0 0 0,0 0 0,0 0 0,0 0 0,0-1 0,0 1 0,-1-1 0,1 0 0,0 0 0,0 0 0,0 0 0,-1 0 0,1-1 0,-1 1 0,1-1 0,-1 0 0,1 1 0,3-5 0,4-4 0,-1 0 0,15-21 0,63-104 0,-46 70 0,109-216 0,-78 139 0,436-816-1365,-478 901-5461</inkml:trace>
-</inkml:ink>
-</file>
-
-<file path=ppt/ink/ink7.xml><?xml version="1.0" encoding="utf-8"?>
-<inkml:ink xmlns:inkml="http://www.w3.org/2003/InkML">
-  <inkml:definitions>
-    <inkml:context xml:id="ctx0">
-      <inkml:inkSource xml:id="inkSrc0">
-        <inkml:traceFormat>
-          <inkml:channel name="X" type="integer" min="-2.14748E9" max="2.14748E9" units="cm"/>
-          <inkml:channel name="Y" type="integer" min="-2.14748E9" max="2.14748E9" units="cm"/>
-          <inkml:channel name="F" type="integer" max="32767" units="dev"/>
-        </inkml:traceFormat>
-        <inkml:channelProperties>
-          <inkml:channelProperty channel="X" name="resolution" value="1000" units="1/cm"/>
-          <inkml:channelProperty channel="Y" name="resolution" value="1000" units="1/cm"/>
-          <inkml:channelProperty channel="F" name="resolution" value="0" units="1/dev"/>
-        </inkml:channelProperties>
-      </inkml:inkSource>
-      <inkml:timestamp xml:id="ts0" timeString="2025-11-20T13:24:01.705"/>
-    </inkml:context>
-    <inkml:brush xml:id="br0">
-      <inkml:brushProperty name="width" value="0.05" units="cm"/>
-      <inkml:brushProperty name="height" value="0.05" units="cm"/>
-      <inkml:brushProperty name="color" value="#E71224"/>
-    </inkml:brush>
-  </inkml:definitions>
-  <inkml:trace contextRef="#ctx0" brushRef="#br0">0 1506 24575,'2'16'0,"1"0"0,0 0 0,1-1 0,0 1 0,2-1 0,0 0 0,9 17 0,-1 0 0,-7-14 0,1 0 0,0-1 0,1-1 0,0 1 0,2-1 0,0-1 0,0 0 0,15 13 0,-24-26 0,0 0 0,0-1 0,0 1 0,0-1 0,1 1 0,-1-1 0,0 0 0,1 0 0,-1 0 0,1 0 0,-1-1 0,1 1 0,-1-1 0,1 1 0,0-1 0,-1 0 0,1 0 0,0 0 0,-1 0 0,1-1 0,-1 1 0,1-1 0,-1 1 0,1-1 0,-1 0 0,1 0 0,-1 0 0,1 0 0,-1-1 0,0 1 0,0-1 0,0 1 0,3-3 0,5-5 0,-1-1 0,1-1 0,-2 1 0,1-1 0,6-13 0,-15 24 0,57-97 0,-5-3 0,49-127 0,-60 129 0,307-744 0,-263 628-1365,-9 29-5461</inkml:trace>
-</inkml:ink>
-</file>
-
-<file path=ppt/ink/ink8.xml><?xml version="1.0" encoding="utf-8"?>
-<inkml:ink xmlns:inkml="http://www.w3.org/2003/InkML">
-  <inkml:definitions>
-    <inkml:context xml:id="ctx0">
-      <inkml:inkSource xml:id="inkSrc0">
-        <inkml:traceFormat>
-          <inkml:channel name="X" type="integer" min="-2.14748E9" max="2.14748E9" units="cm"/>
-          <inkml:channel name="Y" type="integer" min="-2.14748E9" max="2.14748E9" units="cm"/>
-          <inkml:channel name="F" type="integer" max="32767" units="dev"/>
-        </inkml:traceFormat>
-        <inkml:channelProperties>
-          <inkml:channelProperty channel="X" name="resolution" value="1000" units="1/cm"/>
-          <inkml:channelProperty channel="Y" name="resolution" value="1000" units="1/cm"/>
-          <inkml:channelProperty channel="F" name="resolution" value="0" units="1/dev"/>
-        </inkml:channelProperties>
-      </inkml:inkSource>
-      <inkml:timestamp xml:id="ts0" timeString="2025-11-20T13:24:03.689"/>
-    </inkml:context>
-    <inkml:brush xml:id="br0">
-      <inkml:brushProperty name="width" value="0.05" units="cm"/>
-      <inkml:brushProperty name="height" value="0.05" units="cm"/>
-      <inkml:brushProperty name="color" value="#E71224"/>
-    </inkml:brush>
-  </inkml:definitions>
-  <inkml:trace contextRef="#ctx0" brushRef="#br0">0 1500 24575,'2'24'0,"2"0"0,0 0 0,2 0 0,1 0 0,0-1 0,13 25 0,-7-13 0,33 93 0,-46-128 0,0 0 0,0 1 0,0-1 0,0 0 0,0 0 0,0 1 0,0-1 0,0 0 0,0 1 0,0-1 0,1 0 0,-1 0 0,0 1 0,0-1 0,0 0 0,1 0 0,-1 1 0,0-1 0,0 0 0,0 0 0,1 0 0,-1 1 0,0-1 0,1 0 0,-1 0 0,0 0 0,0 0 0,1 0 0,-1 1 0,0-1 0,1 0 0,-1 0 0,0 0 0,1 0 0,-1 0 0,0 0 0,1 0 0,11-10 0,14-27 0,-22 30 0,58-101 0,56-134 0,-42 78 0,10-3 0,7 4 0,7 4 0,7 5 0,153-170 0,-99 149-1365,-15 24-5461</inkml:trace>
-</inkml:ink>
-</file>
-
-<file path=ppt/ink/ink9.xml><?xml version="1.0" encoding="utf-8"?>
-<inkml:ink xmlns:inkml="http://www.w3.org/2003/InkML">
-  <inkml:definitions>
-    <inkml:context xml:id="ctx0">
-      <inkml:inkSource xml:id="inkSrc0">
-        <inkml:traceFormat>
-          <inkml:channel name="X" type="integer" min="-2.14748E9" max="2.14748E9" units="cm"/>
-          <inkml:channel name="Y" type="integer" min="-2.14748E9" max="2.14748E9" units="cm"/>
-          <inkml:channel name="F" type="integer" max="32767" units="dev"/>
-        </inkml:traceFormat>
-        <inkml:channelProperties>
-          <inkml:channelProperty channel="X" name="resolution" value="1000" units="1/cm"/>
-          <inkml:channelProperty channel="Y" name="resolution" value="1000" units="1/cm"/>
-          <inkml:channelProperty channel="F" name="resolution" value="0" units="1/dev"/>
-        </inkml:channelProperties>
-      </inkml:inkSource>
-      <inkml:timestamp xml:id="ts0" timeString="2025-11-20T13:24:09.341"/>
-    </inkml:context>
-    <inkml:brush xml:id="br0">
-      <inkml:brushProperty name="width" value="0.05" units="cm"/>
-      <inkml:brushProperty name="height" value="0.05" units="cm"/>
-      <inkml:brushProperty name="color" value="#E71224"/>
-    </inkml:brush>
-  </inkml:definitions>
-  <inkml:trace contextRef="#ctx0" brushRef="#br0">1 836 24575,'0'5'0,"1"-1"0,0 1 0,1-1 0,-1 0 0,1 1 0,0-1 0,0 0 0,0 0 0,0 0 0,3 3 0,7 14 0,58 120 0,94 280 0,-161-408 0,-1-3 0,1 0 0,0 0 0,7 14 0,-10-23 0,0 0 0,1 0 0,-1 0 0,0-1 0,1 1 0,-1 0 0,1 0 0,-1 0 0,1 0 0,0-1 0,-1 1 0,1 0 0,0 0 0,-1-1 0,1 1 0,0 0 0,0-1 0,0 1 0,0-1 0,-1 1 0,1-1 0,0 0 0,0 1 0,0-1 0,0 0 0,0 0 0,0 0 0,0 1 0,0-1 0,0 0 0,0 0 0,0 0 0,0-1 0,0 1 0,0 0 0,0 0 0,0 0 0,0-1 0,0 1 0,0-1 0,0 1 0,0 0 0,1-2 0,2-1 0,0-1 0,0 1 0,0-1 0,0-1 0,-1 1 0,1 0 0,-1-1 0,4-8 0,21-49 0,-18 34 0,123-325 0,11-28 0,6 65 120,-107 240-863,102-137 1,-83 139-6084</inkml:trace>
-</inkml:ink>
-</file>
-
 <file path=ppt/notesMasters/notesMaster1.xml><?xml version="1.0" encoding="utf-8"?>
 <p:notesMaster xmlns:a="http://schemas.openxmlformats.org/drawingml/2006/main" xmlns:r="http://schemas.openxmlformats.org/officeDocument/2006/relationships" xmlns:p="http://schemas.openxmlformats.org/presentationml/2006/main">
   <p:cSld>
@@ -745,7 +471,7 @@
           <a:p>
             <a:fld id="{2139599A-F55A-43CD-BD42-27C7A89EA2FB}" type="datetimeFigureOut">
               <a:rPr lang="hr-HR" smtClean="0"/>
-              <a:t>20.11.2025.</a:t>
+              <a:t>23.11.2025.</a:t>
             </a:fld>
             <a:endParaRPr lang="hr-HR"/>
           </a:p>
@@ -1012,90 +738,6 @@
 </p:notesMaster>
 </file>
 
-<file path=ppt/notesSlides/notesSlide1.xml><?xml version="1.0" encoding="utf-8"?>
-<p:notes xmlns:a="http://schemas.openxmlformats.org/drawingml/2006/main" xmlns:r="http://schemas.openxmlformats.org/officeDocument/2006/relationships" xmlns:p="http://schemas.openxmlformats.org/presentationml/2006/main">
-  <p:cSld>
-    <p:spTree>
-      <p:nvGrpSpPr>
-        <p:cNvPr id="1" name=""/>
-        <p:cNvGrpSpPr/>
-        <p:nvPr/>
-      </p:nvGrpSpPr>
-      <p:grpSpPr>
-        <a:xfrm>
-          <a:off x="0" y="0"/>
-          <a:ext cx="0" cy="0"/>
-          <a:chOff x="0" y="0"/>
-          <a:chExt cx="0" cy="0"/>
-        </a:xfrm>
-      </p:grpSpPr>
-      <p:sp>
-        <p:nvSpPr>
-          <p:cNvPr id="2" name="Rezervirano mjesto slike slajda 1"/>
-          <p:cNvSpPr>
-            <a:spLocks noGrp="1" noRot="1" noChangeAspect="1"/>
-          </p:cNvSpPr>
-          <p:nvPr>
-            <p:ph type="sldImg"/>
-          </p:nvPr>
-        </p:nvSpPr>
-        <p:spPr/>
-      </p:sp>
-      <p:sp>
-        <p:nvSpPr>
-          <p:cNvPr id="3" name="Rezervirano mjesto bilježaka 2"/>
-          <p:cNvSpPr>
-            <a:spLocks noGrp="1"/>
-          </p:cNvSpPr>
-          <p:nvPr>
-            <p:ph type="body" idx="1"/>
-          </p:nvPr>
-        </p:nvSpPr>
-        <p:spPr/>
-        <p:txBody>
-          <a:bodyPr/>
-          <a:lstStyle/>
-          <a:p>
-            <a:endParaRPr lang="hr-HR" dirty="0"/>
-          </a:p>
-        </p:txBody>
-      </p:sp>
-      <p:sp>
-        <p:nvSpPr>
-          <p:cNvPr id="4" name="Rezervirano mjesto broja slajda 3"/>
-          <p:cNvSpPr>
-            <a:spLocks noGrp="1"/>
-          </p:cNvSpPr>
-          <p:nvPr>
-            <p:ph type="sldNum" sz="quarter" idx="5"/>
-          </p:nvPr>
-        </p:nvSpPr>
-        <p:spPr/>
-        <p:txBody>
-          <a:bodyPr/>
-          <a:lstStyle/>
-          <a:p>
-            <a:fld id="{2DAADE8A-0D1C-4207-9305-34D1513655E1}" type="slidenum">
-              <a:rPr lang="hr-HR" smtClean="0"/>
-              <a:t>4</a:t>
-            </a:fld>
-            <a:endParaRPr lang="hr-HR"/>
-          </a:p>
-        </p:txBody>
-      </p:sp>
-    </p:spTree>
-    <p:extLst>
-      <p:ext uri="{BB962C8B-B14F-4D97-AF65-F5344CB8AC3E}">
-        <p14:creationId xmlns:p14="http://schemas.microsoft.com/office/powerpoint/2010/main" val="3453672182"/>
-      </p:ext>
-    </p:extLst>
-  </p:cSld>
-  <p:clrMapOvr>
-    <a:masterClrMapping/>
-  </p:clrMapOvr>
-</p:notes>
-</file>
-
 <file path=ppt/slideLayouts/slideLayout1.xml><?xml version="1.0" encoding="utf-8"?>
 <p:sldLayout xmlns:a="http://schemas.openxmlformats.org/drawingml/2006/main" xmlns:r="http://schemas.openxmlformats.org/officeDocument/2006/relationships" xmlns:p="http://schemas.openxmlformats.org/presentationml/2006/main" type="title" preserve="1">
   <p:cSld name="Naslovni slajd">
@@ -1225,7 +867,7 @@
           <a:p>
             <a:fld id="{F971FB43-724D-437A-A5E8-1D673BA80D2D}" type="datetimeFigureOut">
               <a:rPr lang="hr-HR" smtClean="0"/>
-              <a:t>20.11.2025.</a:t>
+              <a:t>23.11.2025.</a:t>
             </a:fld>
             <a:endParaRPr lang="hr-HR"/>
           </a:p>
@@ -1393,7 +1035,7 @@
           <a:p>
             <a:fld id="{F971FB43-724D-437A-A5E8-1D673BA80D2D}" type="datetimeFigureOut">
               <a:rPr lang="hr-HR" smtClean="0"/>
-              <a:t>20.11.2025.</a:t>
+              <a:t>23.11.2025.</a:t>
             </a:fld>
             <a:endParaRPr lang="hr-HR"/>
           </a:p>
@@ -1571,7 +1213,7 @@
           <a:p>
             <a:fld id="{F971FB43-724D-437A-A5E8-1D673BA80D2D}" type="datetimeFigureOut">
               <a:rPr lang="hr-HR" smtClean="0"/>
-              <a:t>20.11.2025.</a:t>
+              <a:t>23.11.2025.</a:t>
             </a:fld>
             <a:endParaRPr lang="hr-HR"/>
           </a:p>
@@ -1739,7 +1381,7 @@
           <a:p>
             <a:fld id="{F971FB43-724D-437A-A5E8-1D673BA80D2D}" type="datetimeFigureOut">
               <a:rPr lang="hr-HR" smtClean="0"/>
-              <a:t>20.11.2025.</a:t>
+              <a:t>23.11.2025.</a:t>
             </a:fld>
             <a:endParaRPr lang="hr-HR"/>
           </a:p>
@@ -1984,7 +1626,7 @@
           <a:p>
             <a:fld id="{F971FB43-724D-437A-A5E8-1D673BA80D2D}" type="datetimeFigureOut">
               <a:rPr lang="hr-HR" smtClean="0"/>
-              <a:t>20.11.2025.</a:t>
+              <a:t>23.11.2025.</a:t>
             </a:fld>
             <a:endParaRPr lang="hr-HR"/>
           </a:p>
@@ -2213,7 +1855,7 @@
           <a:p>
             <a:fld id="{F971FB43-724D-437A-A5E8-1D673BA80D2D}" type="datetimeFigureOut">
               <a:rPr lang="hr-HR" smtClean="0"/>
-              <a:t>20.11.2025.</a:t>
+              <a:t>23.11.2025.</a:t>
             </a:fld>
             <a:endParaRPr lang="hr-HR"/>
           </a:p>
@@ -2577,7 +2219,7 @@
           <a:p>
             <a:fld id="{F971FB43-724D-437A-A5E8-1D673BA80D2D}" type="datetimeFigureOut">
               <a:rPr lang="hr-HR" smtClean="0"/>
-              <a:t>20.11.2025.</a:t>
+              <a:t>23.11.2025.</a:t>
             </a:fld>
             <a:endParaRPr lang="hr-HR"/>
           </a:p>
@@ -2694,7 +2336,7 @@
           <a:p>
             <a:fld id="{F971FB43-724D-437A-A5E8-1D673BA80D2D}" type="datetimeFigureOut">
               <a:rPr lang="hr-HR" smtClean="0"/>
-              <a:t>20.11.2025.</a:t>
+              <a:t>23.11.2025.</a:t>
             </a:fld>
             <a:endParaRPr lang="hr-HR"/>
           </a:p>
@@ -2789,7 +2431,7 @@
           <a:p>
             <a:fld id="{F971FB43-724D-437A-A5E8-1D673BA80D2D}" type="datetimeFigureOut">
               <a:rPr lang="hr-HR" smtClean="0"/>
-              <a:t>20.11.2025.</a:t>
+              <a:t>23.11.2025.</a:t>
             </a:fld>
             <a:endParaRPr lang="hr-HR"/>
           </a:p>
@@ -3064,7 +2706,7 @@
           <a:p>
             <a:fld id="{F971FB43-724D-437A-A5E8-1D673BA80D2D}" type="datetimeFigureOut">
               <a:rPr lang="hr-HR" smtClean="0"/>
-              <a:t>20.11.2025.</a:t>
+              <a:t>23.11.2025.</a:t>
             </a:fld>
             <a:endParaRPr lang="hr-HR"/>
           </a:p>
@@ -3316,7 +2958,7 @@
           <a:p>
             <a:fld id="{F971FB43-724D-437A-A5E8-1D673BA80D2D}" type="datetimeFigureOut">
               <a:rPr lang="hr-HR" smtClean="0"/>
-              <a:t>20.11.2025.</a:t>
+              <a:t>23.11.2025.</a:t>
             </a:fld>
             <a:endParaRPr lang="hr-HR"/>
           </a:p>
@@ -3527,7 +3169,7 @@
           <a:p>
             <a:fld id="{F971FB43-724D-437A-A5E8-1D673BA80D2D}" type="datetimeFigureOut">
               <a:rPr lang="hr-HR" smtClean="0"/>
-              <a:t>20.11.2025.</a:t>
+              <a:t>23.11.2025.</a:t>
             </a:fld>
             <a:endParaRPr lang="hr-HR"/>
           </a:p>
@@ -4152,46 +3794,16 @@
           <a:lstStyle/>
           <a:p>
             <a:r>
-              <a:rPr lang="hr-HR" sz="5200">
+              <a:rPr lang="hr-HR" sz="5200" dirty="0" err="1">
                 <a:solidFill>
                   <a:srgbClr val="FFFFFF"/>
                 </a:solidFill>
                 <a:ea typeface="+mj-lt"/>
                 <a:cs typeface="+mj-lt"/>
               </a:rPr>
-              <a:t>NBA </a:t>
-            </a:r>
-            <a:r>
-              <a:rPr lang="hr-HR" sz="5200" err="1">
-                <a:solidFill>
-                  <a:srgbClr val="FFFFFF"/>
-                </a:solidFill>
-                <a:ea typeface="+mj-lt"/>
-                <a:cs typeface="+mj-lt"/>
-              </a:rPr>
-              <a:t>betting</a:t>
-            </a:r>
-            <a:r>
-              <a:rPr lang="hr-HR" sz="5200">
-                <a:solidFill>
-                  <a:srgbClr val="FFFFFF"/>
-                </a:solidFill>
-                <a:ea typeface="+mj-lt"/>
-                <a:cs typeface="+mj-lt"/>
-              </a:rPr>
-              <a:t> </a:t>
-            </a:r>
-            <a:r>
-              <a:rPr lang="hr-HR" sz="5200" err="1">
-                <a:solidFill>
-                  <a:srgbClr val="FFFFFF"/>
-                </a:solidFill>
-                <a:ea typeface="+mj-lt"/>
-                <a:cs typeface="+mj-lt"/>
-              </a:rPr>
-              <a:t>insights</a:t>
-            </a:r>
-            <a:endParaRPr lang="en-US" err="1"/>
+              <a:t>NbetA</a:t>
+            </a:r>
+            <a:endParaRPr lang="en-US" dirty="0"/>
           </a:p>
         </p:txBody>
       </p:sp>
@@ -4226,7 +3838,7 @@
           <a:p>
             <a:pPr algn="l"/>
             <a:r>
-              <a:rPr lang="hr-HR" sz="2000" b="1" err="1">
+              <a:rPr lang="hr-HR" sz="2000" b="1" dirty="0" err="1">
                 <a:solidFill>
                   <a:schemeClr val="bg1"/>
                 </a:solidFill>
@@ -4234,7 +3846,7 @@
               <a:t>Presented</a:t>
             </a:r>
             <a:r>
-              <a:rPr lang="hr-HR" sz="2000" b="1">
+              <a:rPr lang="hr-HR" sz="2000" b="1" dirty="0">
                 <a:solidFill>
                   <a:schemeClr val="bg1"/>
                 </a:solidFill>
@@ -4242,7 +3854,7 @@
               <a:t> </a:t>
             </a:r>
             <a:r>
-              <a:rPr lang="hr-HR" sz="2000" b="1" err="1">
+              <a:rPr lang="hr-HR" sz="2000" b="1" dirty="0" err="1">
                 <a:solidFill>
                   <a:schemeClr val="bg1"/>
                 </a:solidFill>
@@ -4250,7 +3862,7 @@
               <a:t>by</a:t>
             </a:r>
             <a:r>
-              <a:rPr lang="hr-HR" sz="2000" b="1">
+              <a:rPr lang="hr-HR" sz="2000" b="1" dirty="0">
                 <a:solidFill>
                   <a:schemeClr val="bg1"/>
                 </a:solidFill>
@@ -4258,7 +3870,7 @@
               <a:t>: </a:t>
             </a:r>
             <a:r>
-              <a:rPr lang="hr-HR" sz="2000">
+              <a:rPr lang="hr-HR" sz="2000" dirty="0">
                 <a:solidFill>
                   <a:schemeClr val="bg1"/>
                 </a:solidFill>
@@ -4266,7 +3878,7 @@
               <a:t>Luka </a:t>
             </a:r>
             <a:r>
-              <a:rPr lang="hr-HR" sz="2000" err="1">
+              <a:rPr lang="hr-HR" sz="2000" dirty="0" err="1">
                 <a:solidFill>
                   <a:schemeClr val="bg1"/>
                 </a:solidFill>
@@ -4274,7 +3886,7 @@
               <a:t>Zuanović</a:t>
             </a:r>
             <a:r>
-              <a:rPr lang="hr-HR" sz="2000">
+              <a:rPr lang="hr-HR" sz="2000" dirty="0">
                 <a:solidFill>
                   <a:schemeClr val="bg1"/>
                 </a:solidFill>
@@ -4282,14 +3894,14 @@
               <a:t> (130275) Computer </a:t>
             </a:r>
             <a:r>
-              <a:rPr lang="hr-HR" sz="2000" err="1">
+              <a:rPr lang="hr-HR" sz="2000" dirty="0" err="1">
                 <a:solidFill>
                   <a:schemeClr val="bg1"/>
                 </a:solidFill>
               </a:rPr>
               <a:t>Engineering</a:t>
             </a:r>
-            <a:endParaRPr lang="en-US" sz="2000">
+            <a:endParaRPr lang="en-US" sz="2000" dirty="0">
               <a:solidFill>
                 <a:schemeClr val="bg1"/>
               </a:solidFill>
@@ -4298,7 +3910,7 @@
           <a:p>
             <a:pPr algn="l"/>
             <a:r>
-              <a:rPr lang="hr-HR" sz="2000">
+              <a:rPr lang="hr-HR" sz="2000" dirty="0">
                 <a:solidFill>
                   <a:schemeClr val="bg1"/>
                 </a:solidFill>
@@ -4309,7 +3921,7 @@
           <a:p>
             <a:pPr algn="l"/>
             <a:r>
-              <a:rPr lang="hr-HR" sz="2000" b="1" err="1">
+              <a:rPr lang="hr-HR" sz="2000" b="1" dirty="0" err="1">
                 <a:solidFill>
                   <a:schemeClr val="bg1"/>
                 </a:solidFill>
@@ -4317,7 +3929,7 @@
               <a:t>Course</a:t>
             </a:r>
             <a:r>
-              <a:rPr lang="hr-HR" sz="2000" b="1">
+              <a:rPr lang="hr-HR" sz="2000" b="1" dirty="0">
                 <a:solidFill>
                   <a:schemeClr val="bg1"/>
                 </a:solidFill>
@@ -4325,7 +3937,7 @@
               <a:t>:</a:t>
             </a:r>
             <a:r>
-              <a:rPr lang="hr-HR" sz="2000">
+              <a:rPr lang="hr-HR" sz="2000" dirty="0">
                 <a:solidFill>
                   <a:schemeClr val="bg1"/>
                 </a:solidFill>
@@ -4333,7 +3945,7 @@
               <a:t> </a:t>
             </a:r>
             <a:r>
-              <a:rPr lang="hr-HR" sz="2000" err="1">
+              <a:rPr lang="hr-HR" sz="2000" dirty="0" err="1">
                 <a:solidFill>
                   <a:schemeClr val="bg1"/>
                 </a:solidFill>
@@ -4341,7 +3953,7 @@
               <a:t>Information</a:t>
             </a:r>
             <a:r>
-              <a:rPr lang="hr-HR" sz="2000">
+              <a:rPr lang="hr-HR" sz="2000" dirty="0">
                 <a:solidFill>
                   <a:schemeClr val="bg1"/>
                 </a:solidFill>
@@ -4349,7 +3961,7 @@
               <a:t> </a:t>
             </a:r>
             <a:r>
-              <a:rPr lang="hr-HR" sz="2000" err="1">
+              <a:rPr lang="hr-HR" sz="2000" dirty="0" err="1">
                 <a:solidFill>
                   <a:schemeClr val="bg1"/>
                 </a:solidFill>
@@ -4357,7 +3969,7 @@
               <a:t>Visualization</a:t>
             </a:r>
             <a:r>
-              <a:rPr lang="hr-HR" sz="2000">
+              <a:rPr lang="hr-HR" sz="2000" dirty="0">
                 <a:solidFill>
                   <a:schemeClr val="bg1"/>
                 </a:solidFill>
@@ -4368,7 +3980,7 @@
           <a:p>
             <a:pPr algn="l"/>
             <a:r>
-              <a:rPr lang="hr-HR" sz="2000" b="1">
+              <a:rPr lang="hr-HR" sz="2000" b="1" dirty="0">
                 <a:solidFill>
                   <a:schemeClr val="bg1"/>
                 </a:solidFill>
@@ -4376,16 +3988,16 @@
               <a:t>Date:</a:t>
             </a:r>
             <a:r>
-              <a:rPr lang="hr-HR" sz="2000">
+              <a:rPr lang="hr-HR" sz="2000" dirty="0">
                 <a:solidFill>
                   <a:schemeClr val="bg1"/>
                 </a:solidFill>
               </a:rPr>
-              <a:t> 20.10.2025.</a:t>
-            </a:r>
-          </a:p>
-          <a:p>
-            <a:endParaRPr lang="hr-HR" sz="2000">
+              <a:t> 24.11.2025.</a:t>
+            </a:r>
+          </a:p>
+          <a:p>
+            <a:endParaRPr lang="hr-HR" sz="2000" dirty="0">
               <a:solidFill>
                 <a:schemeClr val="bg1"/>
               </a:solidFill>
@@ -4436,6 +4048,536 @@
 </p:sld>
 </file>
 
+<file path=ppt/slides/slide10.xml><?xml version="1.0" encoding="utf-8"?>
+<p:sld xmlns:a="http://schemas.openxmlformats.org/drawingml/2006/main" xmlns:r="http://schemas.openxmlformats.org/officeDocument/2006/relationships" xmlns:p="http://schemas.openxmlformats.org/presentationml/2006/main">
+  <p:cSld>
+    <p:spTree>
+      <p:nvGrpSpPr>
+        <p:cNvPr id="1" name=""/>
+        <p:cNvGrpSpPr/>
+        <p:nvPr/>
+      </p:nvGrpSpPr>
+      <p:grpSpPr>
+        <a:xfrm>
+          <a:off x="0" y="0"/>
+          <a:ext cx="0" cy="0"/>
+          <a:chOff x="0" y="0"/>
+          <a:chExt cx="0" cy="0"/>
+        </a:xfrm>
+      </p:grpSpPr>
+      <p:sp>
+        <p:nvSpPr>
+          <p:cNvPr id="2" name="Naslov 1">
+            <a:extLst>
+              <a:ext uri="{FF2B5EF4-FFF2-40B4-BE49-F238E27FC236}">
+                <a16:creationId xmlns:a16="http://schemas.microsoft.com/office/drawing/2014/main" id="{8D105AAB-1244-943D-0C0A-14BC484451F5}"/>
+              </a:ext>
+            </a:extLst>
+          </p:cNvPr>
+          <p:cNvSpPr>
+            <a:spLocks noGrp="1"/>
+          </p:cNvSpPr>
+          <p:nvPr>
+            <p:ph type="title"/>
+          </p:nvPr>
+        </p:nvSpPr>
+        <p:spPr/>
+        <p:txBody>
+          <a:bodyPr/>
+          <a:lstStyle/>
+          <a:p>
+            <a:r>
+              <a:rPr lang="hr-HR" dirty="0"/>
+              <a:t>Use </a:t>
+            </a:r>
+            <a:r>
+              <a:rPr lang="hr-HR" dirty="0" err="1"/>
+              <a:t>Cases</a:t>
+            </a:r>
+            <a:endParaRPr lang="hr-HR" dirty="0"/>
+          </a:p>
+        </p:txBody>
+      </p:sp>
+      <p:sp>
+        <p:nvSpPr>
+          <p:cNvPr id="3" name="Rezervirano mjesto sadržaja 2">
+            <a:extLst>
+              <a:ext uri="{FF2B5EF4-FFF2-40B4-BE49-F238E27FC236}">
+                <a16:creationId xmlns:a16="http://schemas.microsoft.com/office/drawing/2014/main" id="{177303A2-DF54-BBAB-B942-F0B0035129B6}"/>
+              </a:ext>
+            </a:extLst>
+          </p:cNvPr>
+          <p:cNvSpPr>
+            <a:spLocks noGrp="1"/>
+          </p:cNvSpPr>
+          <p:nvPr>
+            <p:ph idx="1"/>
+          </p:nvPr>
+        </p:nvSpPr>
+        <p:spPr/>
+        <p:txBody>
+          <a:bodyPr/>
+          <a:lstStyle/>
+          <a:p>
+            <a:r>
+              <a:rPr lang="hr-HR" b="1" dirty="0" err="1"/>
+              <a:t>Fast</a:t>
+            </a:r>
+            <a:r>
+              <a:rPr lang="hr-HR" b="1" dirty="0"/>
+              <a:t> </a:t>
+            </a:r>
+            <a:r>
+              <a:rPr lang="hr-HR" b="1" dirty="0" err="1"/>
+              <a:t>insight</a:t>
+            </a:r>
+            <a:r>
+              <a:rPr lang="hr-HR" b="1" dirty="0"/>
+              <a:t> </a:t>
+            </a:r>
+            <a:r>
+              <a:rPr lang="hr-HR" dirty="0" err="1"/>
+              <a:t>into</a:t>
+            </a:r>
+            <a:r>
+              <a:rPr lang="hr-HR" dirty="0"/>
+              <a:t> </a:t>
+            </a:r>
+            <a:r>
+              <a:rPr lang="hr-HR" dirty="0" err="1"/>
+              <a:t>player</a:t>
+            </a:r>
+            <a:r>
+              <a:rPr lang="hr-HR" dirty="0"/>
+              <a:t> </a:t>
+            </a:r>
+            <a:r>
+              <a:rPr lang="hr-HR" dirty="0" err="1"/>
+              <a:t>performances</a:t>
+            </a:r>
+            <a:r>
+              <a:rPr lang="hr-HR" dirty="0"/>
+              <a:t>	⚡</a:t>
+            </a:r>
+          </a:p>
+          <a:p>
+            <a:r>
+              <a:rPr lang="hr-HR" dirty="0" err="1"/>
+              <a:t>Compare</a:t>
+            </a:r>
+            <a:r>
+              <a:rPr lang="hr-HR" dirty="0"/>
+              <a:t> </a:t>
+            </a:r>
+            <a:r>
+              <a:rPr lang="hr-HR" b="1" dirty="0" err="1"/>
+              <a:t>historical</a:t>
+            </a:r>
+            <a:r>
+              <a:rPr lang="hr-HR" b="1" dirty="0"/>
+              <a:t> vs. </a:t>
+            </a:r>
+            <a:r>
+              <a:rPr lang="hr-HR" b="1" dirty="0" err="1"/>
+              <a:t>current</a:t>
+            </a:r>
+            <a:r>
+              <a:rPr lang="hr-HR" b="1" dirty="0"/>
+              <a:t> </a:t>
+            </a:r>
+            <a:r>
+              <a:rPr lang="hr-HR" b="1" dirty="0" err="1"/>
+              <a:t>stats</a:t>
+            </a:r>
+            <a:r>
+              <a:rPr lang="hr-HR" b="1" dirty="0"/>
+              <a:t> 	📊</a:t>
+            </a:r>
+          </a:p>
+          <a:p>
+            <a:r>
+              <a:rPr lang="hr-HR" dirty="0" err="1"/>
+              <a:t>Identifying</a:t>
+            </a:r>
+            <a:r>
+              <a:rPr lang="hr-HR" dirty="0"/>
+              <a:t> </a:t>
+            </a:r>
+            <a:r>
+              <a:rPr lang="hr-HR" b="1" dirty="0" err="1"/>
+              <a:t>trends</a:t>
+            </a:r>
+            <a:r>
+              <a:rPr lang="hr-HR" dirty="0"/>
+              <a:t> </a:t>
+            </a:r>
+            <a:r>
+              <a:rPr lang="hr-HR" dirty="0" err="1"/>
+              <a:t>in</a:t>
+            </a:r>
+            <a:r>
+              <a:rPr lang="hr-HR" dirty="0"/>
+              <a:t> </a:t>
+            </a:r>
+            <a:r>
+              <a:rPr lang="hr-HR" dirty="0" err="1"/>
+              <a:t>player</a:t>
+            </a:r>
+            <a:r>
+              <a:rPr lang="hr-HR" dirty="0"/>
+              <a:t>/</a:t>
+            </a:r>
+            <a:r>
+              <a:rPr lang="hr-HR" dirty="0" err="1"/>
+              <a:t>team</a:t>
+            </a:r>
+            <a:r>
+              <a:rPr lang="hr-HR" dirty="0"/>
+              <a:t> data	📉</a:t>
+            </a:r>
+          </a:p>
+          <a:p>
+            <a:r>
+              <a:rPr lang="en-US" dirty="0"/>
+              <a:t>Support smarter </a:t>
+            </a:r>
+            <a:r>
+              <a:rPr lang="en-US" b="1" dirty="0"/>
+              <a:t>betting</a:t>
+            </a:r>
+            <a:r>
+              <a:rPr lang="en-US" dirty="0"/>
+              <a:t> or </a:t>
+            </a:r>
+            <a:r>
+              <a:rPr lang="en-US" b="1" dirty="0"/>
+              <a:t>fantasy league </a:t>
+            </a:r>
+            <a:r>
+              <a:rPr lang="en-US" dirty="0"/>
+              <a:t>decisions</a:t>
+            </a:r>
+            <a:endParaRPr lang="hr-HR" dirty="0"/>
+          </a:p>
+          <a:p>
+            <a:r>
+              <a:rPr lang="hr-HR" b="1" dirty="0" err="1"/>
+              <a:t>Following</a:t>
+            </a:r>
+            <a:r>
+              <a:rPr lang="hr-HR" b="1" dirty="0"/>
+              <a:t> </a:t>
+            </a:r>
+            <a:r>
+              <a:rPr lang="en-US" dirty="0"/>
+              <a:t>favorite players and teams</a:t>
+            </a:r>
+            <a:r>
+              <a:rPr lang="hr-HR" dirty="0"/>
+              <a:t> </a:t>
+            </a:r>
+          </a:p>
+        </p:txBody>
+      </p:sp>
+      <p:pic>
+        <p:nvPicPr>
+          <p:cNvPr id="1028" name="Picture 4" descr="Luka Dončić Is More Than One of the Best Players in the League — NIKE, Inc.">
+            <a:extLst>
+              <a:ext uri="{FF2B5EF4-FFF2-40B4-BE49-F238E27FC236}">
+                <a16:creationId xmlns:a16="http://schemas.microsoft.com/office/drawing/2014/main" id="{A49C3733-1E1D-F0C7-A86D-0203CBDFA9CD}"/>
+              </a:ext>
+            </a:extLst>
+          </p:cNvPr>
+          <p:cNvPicPr>
+            <a:picLocks noChangeAspect="1" noChangeArrowheads="1"/>
+          </p:cNvPicPr>
+          <p:nvPr/>
+        </p:nvPicPr>
+        <p:blipFill>
+          <a:blip r:embed="rId2">
+            <a:extLst>
+              <a:ext uri="{28A0092B-C50C-407E-A947-70E740481C1C}">
+                <a14:useLocalDpi xmlns:a14="http://schemas.microsoft.com/office/drawing/2010/main" val="0"/>
+              </a:ext>
+            </a:extLst>
+          </a:blip>
+          <a:srcRect/>
+          <a:stretch>
+            <a:fillRect/>
+          </a:stretch>
+        </p:blipFill>
+        <p:spPr bwMode="auto">
+          <a:xfrm>
+            <a:off x="5441365" y="4423879"/>
+            <a:ext cx="1309270" cy="2182117"/>
+          </a:xfrm>
+          <a:prstGeom prst="rect">
+            <a:avLst/>
+          </a:prstGeom>
+          <a:noFill/>
+          <a:extLst>
+            <a:ext uri="{909E8E84-426E-40DD-AFC4-6F175D3DCCD1}">
+              <a14:hiddenFill xmlns:a14="http://schemas.microsoft.com/office/drawing/2010/main">
+                <a:solidFill>
+                  <a:srgbClr val="FFFFFF"/>
+                </a:solidFill>
+              </a14:hiddenFill>
+            </a:ext>
+          </a:extLst>
+        </p:spPr>
+      </p:pic>
+    </p:spTree>
+    <p:extLst>
+      <p:ext uri="{BB962C8B-B14F-4D97-AF65-F5344CB8AC3E}">
+        <p14:creationId xmlns:p14="http://schemas.microsoft.com/office/powerpoint/2010/main" val="2452226369"/>
+      </p:ext>
+    </p:extLst>
+  </p:cSld>
+  <p:clrMapOvr>
+    <a:masterClrMapping/>
+  </p:clrMapOvr>
+</p:sld>
+</file>
+
+<file path=ppt/slides/slide11.xml><?xml version="1.0" encoding="utf-8"?>
+<p:sld xmlns:a="http://schemas.openxmlformats.org/drawingml/2006/main" xmlns:r="http://schemas.openxmlformats.org/officeDocument/2006/relationships" xmlns:p="http://schemas.openxmlformats.org/presentationml/2006/main">
+  <p:cSld>
+    <p:spTree>
+      <p:nvGrpSpPr>
+        <p:cNvPr id="1" name=""/>
+        <p:cNvGrpSpPr/>
+        <p:nvPr/>
+      </p:nvGrpSpPr>
+      <p:grpSpPr>
+        <a:xfrm>
+          <a:off x="0" y="0"/>
+          <a:ext cx="0" cy="0"/>
+          <a:chOff x="0" y="0"/>
+          <a:chExt cx="0" cy="0"/>
+        </a:xfrm>
+      </p:grpSpPr>
+      <p:sp>
+        <p:nvSpPr>
+          <p:cNvPr id="2" name="Naslov 1">
+            <a:extLst>
+              <a:ext uri="{FF2B5EF4-FFF2-40B4-BE49-F238E27FC236}">
+                <a16:creationId xmlns:a16="http://schemas.microsoft.com/office/drawing/2014/main" id="{CE8FF485-8A35-BE58-8A90-605A96B648A1}"/>
+              </a:ext>
+            </a:extLst>
+          </p:cNvPr>
+          <p:cNvSpPr>
+            <a:spLocks noGrp="1"/>
+          </p:cNvSpPr>
+          <p:nvPr>
+            <p:ph type="title"/>
+          </p:nvPr>
+        </p:nvSpPr>
+        <p:spPr/>
+        <p:txBody>
+          <a:bodyPr/>
+          <a:lstStyle/>
+          <a:p>
+            <a:r>
+              <a:rPr lang="hr-HR" dirty="0" err="1"/>
+              <a:t>Conclusion</a:t>
+            </a:r>
+            <a:endParaRPr lang="hr-HR" dirty="0"/>
+          </a:p>
+        </p:txBody>
+      </p:sp>
+      <p:sp>
+        <p:nvSpPr>
+          <p:cNvPr id="3" name="Rezervirano mjesto sadržaja 2">
+            <a:extLst>
+              <a:ext uri="{FF2B5EF4-FFF2-40B4-BE49-F238E27FC236}">
+                <a16:creationId xmlns:a16="http://schemas.microsoft.com/office/drawing/2014/main" id="{3F7DED39-5B8B-6D52-48F1-3390BA588B78}"/>
+              </a:ext>
+            </a:extLst>
+          </p:cNvPr>
+          <p:cNvSpPr>
+            <a:spLocks noGrp="1"/>
+          </p:cNvSpPr>
+          <p:nvPr>
+            <p:ph idx="1"/>
+          </p:nvPr>
+        </p:nvSpPr>
+        <p:spPr/>
+        <p:txBody>
+          <a:bodyPr/>
+          <a:lstStyle/>
+          <a:p>
+            <a:r>
+              <a:rPr lang="hr-HR" b="1" dirty="0" err="1"/>
+              <a:t>Fast</a:t>
+            </a:r>
+            <a:r>
+              <a:rPr lang="hr-HR" dirty="0"/>
+              <a:t> </a:t>
+            </a:r>
+            <a:r>
+              <a:rPr lang="hr-HR" dirty="0" err="1"/>
+              <a:t>access</a:t>
+            </a:r>
+            <a:r>
+              <a:rPr lang="hr-HR" dirty="0"/>
+              <a:t> to </a:t>
+            </a:r>
+            <a:r>
+              <a:rPr lang="hr-HR" dirty="0" err="1"/>
+              <a:t>key</a:t>
+            </a:r>
+            <a:r>
+              <a:rPr lang="hr-HR" dirty="0"/>
+              <a:t> NBA data</a:t>
+            </a:r>
+          </a:p>
+          <a:p>
+            <a:r>
+              <a:rPr lang="hr-HR" b="1" dirty="0" err="1"/>
+              <a:t>Personalized</a:t>
+            </a:r>
+            <a:r>
+              <a:rPr lang="hr-HR" b="1" dirty="0"/>
+              <a:t> </a:t>
+            </a:r>
+            <a:r>
+              <a:rPr lang="hr-HR" b="1" dirty="0" err="1"/>
+              <a:t>user</a:t>
+            </a:r>
+            <a:r>
+              <a:rPr lang="hr-HR" b="1" dirty="0"/>
+              <a:t> </a:t>
+            </a:r>
+            <a:r>
+              <a:rPr lang="hr-HR" b="1" dirty="0" err="1"/>
+              <a:t>experience</a:t>
+            </a:r>
+            <a:r>
+              <a:rPr lang="hr-HR" dirty="0"/>
+              <a:t> </a:t>
+            </a:r>
+            <a:endParaRPr lang="hr-HR" b="1" dirty="0"/>
+          </a:p>
+          <a:p>
+            <a:endParaRPr lang="hr-HR" b="1" dirty="0"/>
+          </a:p>
+          <a:p>
+            <a:r>
+              <a:rPr lang="hr-HR" b="1" dirty="0" err="1"/>
+              <a:t>Possible</a:t>
+            </a:r>
+            <a:r>
+              <a:rPr lang="hr-HR" b="1" dirty="0"/>
+              <a:t> </a:t>
+            </a:r>
+            <a:r>
+              <a:rPr lang="hr-HR" b="1" dirty="0" err="1"/>
+              <a:t>augmentations</a:t>
+            </a:r>
+            <a:r>
+              <a:rPr lang="hr-HR" b="1" dirty="0"/>
+              <a:t>:</a:t>
+            </a:r>
+          </a:p>
+          <a:p>
+            <a:pPr lvl="1"/>
+            <a:r>
+              <a:rPr lang="hr-HR" dirty="0" err="1"/>
+              <a:t>Frequent</a:t>
+            </a:r>
+            <a:r>
+              <a:rPr lang="hr-HR" dirty="0"/>
+              <a:t> </a:t>
+            </a:r>
+            <a:r>
+              <a:rPr lang="hr-HR" b="1" dirty="0" err="1"/>
+              <a:t>stats</a:t>
+            </a:r>
+            <a:r>
+              <a:rPr lang="hr-HR" b="1" dirty="0"/>
+              <a:t> </a:t>
+            </a:r>
+            <a:r>
+              <a:rPr lang="hr-HR" b="1" dirty="0" err="1"/>
+              <a:t>updates</a:t>
+            </a:r>
+            <a:endParaRPr lang="hr-HR" b="1" dirty="0"/>
+          </a:p>
+          <a:p>
+            <a:pPr lvl="1"/>
+            <a:r>
+              <a:rPr lang="hr-HR" b="1" dirty="0"/>
+              <a:t>Separate date </a:t>
+            </a:r>
+            <a:r>
+              <a:rPr lang="hr-HR" b="1" dirty="0" err="1"/>
+              <a:t>filters</a:t>
+            </a:r>
+            <a:r>
+              <a:rPr lang="hr-HR" b="1" dirty="0"/>
+              <a:t> </a:t>
+            </a:r>
+            <a:r>
+              <a:rPr lang="hr-HR" dirty="0"/>
+              <a:t>for </a:t>
+            </a:r>
+            <a:r>
+              <a:rPr lang="hr-HR" dirty="0" err="1"/>
+              <a:t>player</a:t>
+            </a:r>
+            <a:r>
+              <a:rPr lang="hr-HR" dirty="0"/>
+              <a:t> </a:t>
+            </a:r>
+            <a:r>
+              <a:rPr lang="hr-HR" dirty="0" err="1"/>
+              <a:t>comparison</a:t>
+            </a:r>
+            <a:endParaRPr lang="hr-HR" dirty="0"/>
+          </a:p>
+          <a:p>
+            <a:pPr lvl="1"/>
+            <a:r>
+              <a:rPr lang="hr-HR" dirty="0" err="1"/>
+              <a:t>Incorporating</a:t>
+            </a:r>
+            <a:r>
+              <a:rPr lang="hr-HR" dirty="0"/>
+              <a:t> </a:t>
+            </a:r>
+            <a:r>
+              <a:rPr lang="hr-HR" b="1" dirty="0"/>
+              <a:t>more </a:t>
+            </a:r>
+            <a:r>
+              <a:rPr lang="hr-HR" b="1" dirty="0" err="1"/>
+              <a:t>advanced</a:t>
+            </a:r>
+            <a:r>
+              <a:rPr lang="hr-HR" b="1" dirty="0"/>
+              <a:t> </a:t>
+            </a:r>
+            <a:r>
+              <a:rPr lang="hr-HR" b="1" dirty="0" err="1"/>
+              <a:t>metrics</a:t>
+            </a:r>
+            <a:endParaRPr lang="hr-HR" b="1" dirty="0"/>
+          </a:p>
+        </p:txBody>
+      </p:sp>
+    </p:spTree>
+    <p:extLst>
+      <p:ext uri="{BB962C8B-B14F-4D97-AF65-F5344CB8AC3E}">
+        <p14:creationId xmlns:p14="http://schemas.microsoft.com/office/powerpoint/2010/main" val="2614005834"/>
+      </p:ext>
+    </p:extLst>
+  </p:cSld>
+  <p:clrMapOvr>
+    <a:masterClrMapping/>
+  </p:clrMapOvr>
+</p:sld>
+</file>
+
 <file path=ppt/slides/slide2.xml><?xml version="1.0" encoding="utf-8"?>
 <p:sld xmlns:a="http://schemas.openxmlformats.org/drawingml/2006/main" xmlns:r="http://schemas.openxmlformats.org/officeDocument/2006/relationships" xmlns:p="http://schemas.openxmlformats.org/presentationml/2006/main">
   <p:cSld>
@@ -4492,7 +4634,28 @@
                 <a:ea typeface="+mj-lt"/>
                 <a:cs typeface="+mj-lt"/>
               </a:rPr>
-              <a:t>🏀  Project goal</a:t>
+              <a:t>🏀  </a:t>
+            </a:r>
+            <a:r>
+              <a:rPr lang="hr-HR" dirty="0" err="1">
+                <a:ea typeface="+mj-lt"/>
+                <a:cs typeface="+mj-lt"/>
+              </a:rPr>
+              <a:t>Our</a:t>
+            </a:r>
+            <a:r>
+              <a:rPr lang="hr-HR" dirty="0">
+                <a:ea typeface="+mj-lt"/>
+                <a:cs typeface="+mj-lt"/>
+              </a:rPr>
+              <a:t> </a:t>
+            </a:r>
+            <a:r>
+              <a:rPr lang="hr-HR" dirty="0" err="1">
+                <a:ea typeface="+mj-lt"/>
+                <a:cs typeface="+mj-lt"/>
+              </a:rPr>
+              <a:t>Vision</a:t>
             </a:r>
             <a:endParaRPr lang="en-US" dirty="0"/>
           </a:p>
@@ -4522,16 +4685,30 @@
         </p:spPr>
         <p:txBody>
           <a:bodyPr vert="horz" lIns="91440" tIns="45720" rIns="91440" bIns="45720" rtlCol="0" anchor="t">
-            <a:normAutofit lnSpcReduction="10000"/>
+            <a:normAutofit/>
           </a:bodyPr>
           <a:lstStyle/>
           <a:p>
+            <a:r>
+              <a:rPr lang="hr-HR" dirty="0">
+                <a:ea typeface="+mn-lt"/>
+                <a:cs typeface="+mn-lt"/>
+              </a:rPr>
+              <a:t>I</a:t>
+            </a:r>
+            <a:r>
+              <a:rPr lang="en-US" dirty="0" err="1">
+                <a:ea typeface="+mn-lt"/>
+                <a:cs typeface="+mn-lt"/>
+              </a:rPr>
+              <a:t>nteractive</a:t>
+            </a:r>
             <a:r>
               <a:rPr lang="en-US" dirty="0">
                 <a:ea typeface="+mn-lt"/>
                 <a:cs typeface="+mn-lt"/>
               </a:rPr>
-              <a:t>To build an interactive </a:t>
+              <a:t> </a:t>
             </a:r>
             <a:r>
               <a:rPr lang="en-US" b="1" dirty="0">
@@ -4540,6 +4717,46 @@
               </a:rPr>
               <a:t>NBA data visualization system</a:t>
             </a:r>
+          </a:p>
+          <a:p>
+            <a:r>
+              <a:rPr lang="hr-HR" b="1" dirty="0" err="1">
+                <a:ea typeface="+mn-lt"/>
+                <a:cs typeface="+mn-lt"/>
+              </a:rPr>
+              <a:t>Purpose</a:t>
+            </a:r>
+            <a:r>
+              <a:rPr lang="hr-HR" b="1" dirty="0">
+                <a:ea typeface="+mn-lt"/>
+                <a:cs typeface="+mn-lt"/>
+              </a:rPr>
+              <a:t>: </a:t>
+            </a:r>
+            <a:r>
+              <a:rPr lang="en-US" dirty="0"/>
+              <a:t>Empowering basketball fans and sports bettors with actionable insights</a:t>
+            </a:r>
+            <a:r>
+              <a:rPr lang="hr-HR" dirty="0"/>
+              <a:t>.</a:t>
+            </a:r>
+            <a:endParaRPr lang="en-US" b="1" dirty="0"/>
+          </a:p>
+          <a:p>
+            <a:endParaRPr lang="en-US" b="1" dirty="0">
+              <a:ea typeface="+mn-lt"/>
+              <a:cs typeface="+mn-lt"/>
+            </a:endParaRPr>
+          </a:p>
+          <a:p>
+            <a:r>
+              <a:rPr lang="hr-HR" b="1" dirty="0" err="1">
+                <a:ea typeface="+mn-lt"/>
+                <a:cs typeface="+mn-lt"/>
+              </a:rPr>
+              <a:t>Key</a:t>
+            </a:r>
             <a:r>
               <a:rPr lang="hr-HR" b="1" dirty="0">
                 <a:ea typeface="+mn-lt"/>
@@ -4548,25 +4765,162 @@
               <a:t> </a:t>
             </a:r>
             <a:r>
+              <a:rPr lang="hr-HR" b="1" dirty="0" err="1">
+                <a:ea typeface="+mn-lt"/>
+                <a:cs typeface="+mn-lt"/>
+              </a:rPr>
+              <a:t>features</a:t>
+            </a:r>
+            <a:r>
+              <a:rPr lang="hr-HR" b="1" dirty="0">
+                <a:ea typeface="+mn-lt"/>
+                <a:cs typeface="+mn-lt"/>
+              </a:rPr>
+              <a:t>:</a:t>
+            </a:r>
+            <a:endParaRPr lang="en-US" b="1" dirty="0"/>
+          </a:p>
+          <a:p>
+            <a:pPr marL="914400" lvl="1" indent="-457200">
+              <a:buAutoNum type="arabicPeriod"/>
+            </a:pPr>
+            <a:r>
+              <a:rPr lang="en-US" dirty="0">
+                <a:ea typeface="+mn-lt"/>
+                <a:cs typeface="+mn-lt"/>
+              </a:rPr>
+              <a:t>Filter data by </a:t>
+            </a:r>
+            <a:r>
+              <a:rPr lang="en-US" b="1" dirty="0">
+                <a:ea typeface="+mn-lt"/>
+                <a:cs typeface="+mn-lt"/>
+              </a:rPr>
+              <a:t>players, teams, seasons and statistics</a:t>
+            </a:r>
+            <a:r>
+              <a:rPr lang="hr-HR" b="1" dirty="0">
+                <a:ea typeface="+mn-lt"/>
+                <a:cs typeface="+mn-lt"/>
+              </a:rPr>
+              <a:t>   </a:t>
+            </a:r>
+            <a:r>
+              <a:rPr lang="hr-HR" dirty="0"/>
+              <a:t>🔍</a:t>
+            </a:r>
+            <a:endParaRPr lang="en-US" b="1" dirty="0"/>
+          </a:p>
+          <a:p>
+            <a:pPr marL="914400" lvl="1" indent="-457200">
+              <a:buAutoNum type="arabicPeriod"/>
+            </a:pPr>
+            <a:r>
+              <a:rPr lang="en-US" dirty="0">
+                <a:ea typeface="+mn-lt"/>
+                <a:cs typeface="+mn-lt"/>
+              </a:rPr>
+              <a:t>Compare </a:t>
+            </a:r>
+            <a:r>
+              <a:rPr lang="en-US" b="1" dirty="0">
+                <a:ea typeface="+mn-lt"/>
+                <a:cs typeface="+mn-lt"/>
+              </a:rPr>
+              <a:t>historical and current performance</a:t>
+            </a:r>
+            <a:r>
+              <a:rPr lang="hr-HR" b="1" dirty="0">
+                <a:ea typeface="+mn-lt"/>
+                <a:cs typeface="+mn-lt"/>
+              </a:rPr>
+              <a:t>  </a:t>
+            </a:r>
+            <a:r>
+              <a:rPr lang="hr-HR" dirty="0"/>
+              <a:t>📊</a:t>
+            </a:r>
+            <a:endParaRPr lang="en-US" b="1" dirty="0"/>
+          </a:p>
+          <a:p>
+            <a:pPr marL="914400" lvl="1" indent="-457200">
+              <a:buAutoNum type="arabicPeriod"/>
+            </a:pPr>
+            <a:r>
+              <a:rPr lang="en-US" dirty="0">
+                <a:ea typeface="+mn-lt"/>
+                <a:cs typeface="+mn-lt"/>
+              </a:rPr>
+              <a:t>Identify </a:t>
+            </a:r>
+            <a:r>
+              <a:rPr lang="en-US" b="1" dirty="0">
+                <a:ea typeface="+mn-lt"/>
+                <a:cs typeface="+mn-lt"/>
+              </a:rPr>
+              <a:t>patterns that support smarter betting decisions</a:t>
+            </a:r>
+            <a:r>
+              <a:rPr lang="hr-HR" b="1" dirty="0">
+                <a:ea typeface="+mn-lt"/>
+                <a:cs typeface="+mn-lt"/>
+              </a:rPr>
+              <a:t> </a:t>
+            </a:r>
+            <a:r>
+              <a:rPr lang="hr-HR" dirty="0"/>
+              <a:t>📉</a:t>
+            </a:r>
+            <a:endParaRPr lang="hr-HR" b="1" dirty="0">
+              <a:ea typeface="+mn-lt"/>
+              <a:cs typeface="+mn-lt"/>
+            </a:endParaRPr>
+          </a:p>
+          <a:p>
+            <a:pPr marL="914400" lvl="1" indent="-457200">
+              <a:buAutoNum type="arabicPeriod"/>
+            </a:pPr>
+            <a:r>
+              <a:rPr lang="hr-HR" b="1" dirty="0" err="1">
+                <a:ea typeface="+mn-lt"/>
+                <a:cs typeface="+mn-lt"/>
+              </a:rPr>
+              <a:t>Personalized</a:t>
+            </a:r>
+            <a:r>
+              <a:rPr lang="hr-HR" b="1" dirty="0">
+                <a:ea typeface="+mn-lt"/>
+                <a:cs typeface="+mn-lt"/>
+              </a:rPr>
+              <a:t> </a:t>
+            </a:r>
+            <a:r>
+              <a:rPr lang="hr-HR" b="1" dirty="0" err="1">
+                <a:ea typeface="+mn-lt"/>
+                <a:cs typeface="+mn-lt"/>
+              </a:rPr>
+              <a:t>experience</a:t>
+            </a:r>
+            <a:r>
+              <a:rPr lang="hr-HR" b="1" dirty="0">
+                <a:ea typeface="+mn-lt"/>
+                <a:cs typeface="+mn-lt"/>
+              </a:rPr>
+              <a:t> </a:t>
+            </a:r>
+            <a:r>
+              <a:rPr lang="hr-HR" dirty="0">
+                <a:ea typeface="+mn-lt"/>
+                <a:cs typeface="+mn-lt"/>
+              </a:rPr>
+              <a:t>to </a:t>
+            </a:r>
+            <a:r>
               <a:rPr lang="hr-HR" dirty="0" err="1">
                 <a:ea typeface="+mn-lt"/>
                 <a:cs typeface="+mn-lt"/>
               </a:rPr>
-              <a:t>based</a:t>
-            </a:r>
-            <a:r>
-              <a:rPr lang="hr-HR" dirty="0">
-                <a:ea typeface="+mn-lt"/>
-                <a:cs typeface="+mn-lt"/>
-              </a:rPr>
-              <a:t> on </a:t>
-            </a:r>
-            <a:r>
-              <a:rPr lang="hr-HR" dirty="0" err="1">
-                <a:ea typeface="+mn-lt"/>
-                <a:cs typeface="+mn-lt"/>
-              </a:rPr>
-              <a:t>the</a:t>
+              <a:t>each</a:t>
             </a:r>
             <a:r>
               <a:rPr lang="hr-HR" dirty="0">
@@ -4580,151 +4934,18 @@
                 <a:ea typeface="+mn-lt"/>
                 <a:cs typeface="+mn-lt"/>
               </a:rPr>
-              <a:t>official</a:t>
+              <a:t>user</a:t>
             </a:r>
             <a:r>
               <a:rPr lang="hr-HR" dirty="0">
                 <a:ea typeface="+mn-lt"/>
                 <a:cs typeface="+mn-lt"/>
               </a:rPr>
-              <a:t> NBA </a:t>
-            </a:r>
-            <a:r>
-              <a:rPr lang="hr-HR" dirty="0" err="1">
-                <a:ea typeface="+mn-lt"/>
-                <a:cs typeface="+mn-lt"/>
-              </a:rPr>
-              <a:t>dataset</a:t>
-            </a:r>
-            <a:r>
-              <a:rPr lang="hr-HR" dirty="0">
-                <a:ea typeface="+mn-lt"/>
-                <a:cs typeface="+mn-lt"/>
-              </a:rPr>
-              <a:t> </a:t>
-            </a:r>
-            <a:r>
-              <a:rPr lang="hr-HR" dirty="0" err="1">
-                <a:ea typeface="+mn-lt"/>
-                <a:cs typeface="+mn-lt"/>
-              </a:rPr>
-              <a:t>from</a:t>
-            </a:r>
-            <a:r>
-              <a:rPr lang="hr-HR" dirty="0">
-                <a:ea typeface="+mn-lt"/>
-                <a:cs typeface="+mn-lt"/>
-              </a:rPr>
-              <a:t> 1947. - </a:t>
-            </a:r>
-            <a:r>
-              <a:rPr lang="hr-HR" dirty="0" err="1">
-                <a:ea typeface="+mn-lt"/>
-                <a:cs typeface="+mn-lt"/>
-              </a:rPr>
-              <a:t>today</a:t>
-            </a:r>
-            <a:endParaRPr lang="en-US" dirty="0"/>
-          </a:p>
-          <a:p>
-            <a:pPr marL="0" indent="0">
-              <a:buNone/>
-            </a:pPr>
-            <a:endParaRPr lang="en-US" b="1" dirty="0">
-              <a:ea typeface="+mn-lt"/>
-              <a:cs typeface="+mn-lt"/>
-            </a:endParaRPr>
-          </a:p>
-          <a:p>
-            <a:r>
-              <a:rPr lang="en-US" dirty="0">
-                <a:ea typeface="+mn-lt"/>
-                <a:cs typeface="+mn-lt"/>
-              </a:rPr>
-              <a:t>Empower </a:t>
-            </a:r>
-            <a:r>
-              <a:rPr lang="en-US" b="1" dirty="0">
-                <a:ea typeface="+mn-lt"/>
-                <a:cs typeface="+mn-lt"/>
-              </a:rPr>
-              <a:t>basketball fans and sports bettors</a:t>
-            </a:r>
-            <a:r>
-              <a:rPr lang="en-US" dirty="0">
-                <a:ea typeface="+mn-lt"/>
-                <a:cs typeface="+mn-lt"/>
-              </a:rPr>
-              <a:t> with actionable insights</a:t>
-            </a:r>
-            <a:endParaRPr lang="en-US" b="1" dirty="0"/>
-          </a:p>
-          <a:p>
-            <a:endParaRPr lang="en-US" b="1" dirty="0">
-              <a:ea typeface="+mn-lt"/>
-              <a:cs typeface="+mn-lt"/>
-            </a:endParaRPr>
-          </a:p>
-          <a:p>
-            <a:r>
-              <a:rPr lang="en-US" dirty="0">
-                <a:ea typeface="+mn-lt"/>
-                <a:cs typeface="+mn-lt"/>
-              </a:rPr>
-              <a:t>Through dynamic and customizable </a:t>
-            </a:r>
-            <a:r>
-              <a:rPr lang="en-US" b="1" dirty="0">
-                <a:ea typeface="+mn-lt"/>
-                <a:cs typeface="+mn-lt"/>
-              </a:rPr>
-              <a:t>visualizations</a:t>
-            </a:r>
-            <a:r>
-              <a:rPr lang="en-US" dirty="0">
-                <a:ea typeface="+mn-lt"/>
-                <a:cs typeface="+mn-lt"/>
-              </a:rPr>
-              <a:t>, users will be able to:</a:t>
-            </a:r>
-            <a:endParaRPr lang="en-US" b="1" dirty="0"/>
-          </a:p>
-          <a:p>
-            <a:pPr marL="914400" lvl="1" indent="-457200">
-              <a:buAutoNum type="arabicPeriod"/>
-            </a:pPr>
-            <a:r>
-              <a:rPr lang="en-US" dirty="0">
-                <a:ea typeface="+mn-lt"/>
-                <a:cs typeface="+mn-lt"/>
-              </a:rPr>
-              <a:t>Filter data by players, teams, seasons and statistics</a:t>
-            </a:r>
-            <a:endParaRPr lang="en-US" dirty="0"/>
-          </a:p>
-          <a:p>
-            <a:pPr marL="914400" lvl="1" indent="-457200">
-              <a:buAutoNum type="arabicPeriod"/>
-            </a:pPr>
-            <a:r>
-              <a:rPr lang="en-US" dirty="0">
-                <a:ea typeface="+mn-lt"/>
-                <a:cs typeface="+mn-lt"/>
-              </a:rPr>
-              <a:t>Compare historical and current performance</a:t>
-            </a:r>
-            <a:endParaRPr lang="en-US" dirty="0"/>
-          </a:p>
-          <a:p>
-            <a:pPr marL="914400" lvl="1" indent="-457200">
-              <a:buAutoNum type="arabicPeriod"/>
-            </a:pPr>
-            <a:r>
-              <a:rPr lang="en-US" dirty="0">
-                <a:ea typeface="+mn-lt"/>
-                <a:cs typeface="+mn-lt"/>
-              </a:rPr>
-              <a:t>Identify patterns that support smarter betting decisions</a:t>
+              <a:t>   </a:t>
+            </a:r>
+            <a:r>
+              <a:rPr lang="hr-HR" dirty="0"/>
+              <a:t>👤</a:t>
             </a:r>
             <a:endParaRPr lang="en-US" dirty="0"/>
           </a:p>
@@ -4757,14 +4978,6 @@
 <file path=ppt/slides/slide3.xml><?xml version="1.0" encoding="utf-8"?>
 <p:sld xmlns:a="http://schemas.openxmlformats.org/drawingml/2006/main" xmlns:r="http://schemas.openxmlformats.org/officeDocument/2006/relationships" xmlns:p="http://schemas.openxmlformats.org/presentationml/2006/main">
   <p:cSld>
-    <p:bg>
-      <p:bgPr>
-        <a:solidFill>
-          <a:schemeClr val="bg1"/>
-        </a:solidFill>
-        <a:effectLst/>
-      </p:bgPr>
-    </p:bg>
     <p:spTree>
       <p:nvGrpSpPr>
         <p:cNvPr id="1" name=""/>
@@ -4781,10 +4994,10 @@
       </p:grpSpPr>
       <p:sp>
         <p:nvSpPr>
-          <p:cNvPr id="2" name="Title 1">
+          <p:cNvPr id="2" name="Naslov 1">
             <a:extLst>
               <a:ext uri="{FF2B5EF4-FFF2-40B4-BE49-F238E27FC236}">
-                <a16:creationId xmlns:a16="http://schemas.microsoft.com/office/drawing/2014/main" id="{769E7923-70E3-BE6F-3F95-9F4EC316F2C9}"/>
+                <a16:creationId xmlns:a16="http://schemas.microsoft.com/office/drawing/2014/main" id="{16F3BF58-3988-510F-EF78-49D858A905E1}"/>
               </a:ext>
             </a:extLst>
           </p:cNvPr>
@@ -4795,332 +5008,249 @@
             <p:ph type="title"/>
           </p:nvPr>
         </p:nvSpPr>
-        <p:spPr>
-          <a:xfrm>
-            <a:off x="367553" y="73772"/>
-            <a:ext cx="10515600" cy="1325563"/>
-          </a:xfrm>
-        </p:spPr>
+        <p:spPr/>
         <p:txBody>
           <a:bodyPr/>
           <a:lstStyle/>
           <a:p>
-            <a:pPr marL="742950" indent="-742950">
-              <a:buAutoNum type="arabicPeriod"/>
+            <a:r>
+              <a:rPr lang="hr-HR" dirty="0"/>
+              <a:t>NBA </a:t>
+            </a:r>
+            <a:r>
+              <a:rPr lang="hr-HR" dirty="0" err="1"/>
+              <a:t>Dataset</a:t>
+            </a:r>
+            <a:r>
+              <a:rPr lang="hr-HR" dirty="0"/>
+              <a:t> (2005 – 2014)</a:t>
+            </a:r>
+          </a:p>
+        </p:txBody>
+      </p:sp>
+      <p:sp>
+        <p:nvSpPr>
+          <p:cNvPr id="3" name="Rezervirano mjesto sadržaja 2">
+            <a:extLst>
+              <a:ext uri="{FF2B5EF4-FFF2-40B4-BE49-F238E27FC236}">
+                <a16:creationId xmlns:a16="http://schemas.microsoft.com/office/drawing/2014/main" id="{2117DF82-1EFA-BF64-6195-822DA35042CD}"/>
+              </a:ext>
+            </a:extLst>
+          </p:cNvPr>
+          <p:cNvSpPr>
+            <a:spLocks noGrp="1"/>
+          </p:cNvSpPr>
+          <p:nvPr>
+            <p:ph idx="1"/>
+          </p:nvPr>
+        </p:nvSpPr>
+        <p:spPr/>
+        <p:txBody>
+          <a:bodyPr/>
+          <a:lstStyle/>
+          <a:p>
+            <a:r>
+              <a:rPr lang="hr-HR" b="1" dirty="0" err="1"/>
+              <a:t>Source</a:t>
+            </a:r>
+            <a:r>
+              <a:rPr lang="hr-HR" b="1" dirty="0"/>
+              <a:t>:</a:t>
+            </a:r>
+          </a:p>
+          <a:p>
+            <a:pPr lvl="1"/>
+            <a:r>
+              <a:rPr lang="hr-HR" dirty="0" err="1">
+                <a:hlinkClick r:id="rId2"/>
+              </a:rPr>
+              <a:t>Wyatt</a:t>
+            </a:r>
+            <a:r>
+              <a:rPr lang="hr-HR" dirty="0">
+                <a:hlinkClick r:id="rId2"/>
+              </a:rPr>
+              <a:t> Walsh – </a:t>
+            </a:r>
+            <a:r>
+              <a:rPr lang="hr-HR" dirty="0" err="1">
+                <a:hlinkClick r:id="rId2"/>
+              </a:rPr>
+              <a:t>Basketball</a:t>
+            </a:r>
+            <a:r>
+              <a:rPr lang="hr-HR" dirty="0">
+                <a:hlinkClick r:id="rId2"/>
+              </a:rPr>
+              <a:t> </a:t>
+            </a:r>
+            <a:r>
+              <a:rPr lang="hr-HR" dirty="0" err="1">
+                <a:hlinkClick r:id="rId2"/>
+              </a:rPr>
+              <a:t>dataset</a:t>
+            </a:r>
+            <a:endParaRPr lang="hr-HR" dirty="0"/>
+          </a:p>
+          <a:p>
+            <a:pPr lvl="1"/>
+            <a:r>
+              <a:rPr lang="en-US" dirty="0">
+                <a:hlinkClick r:id="rId3"/>
+              </a:rPr>
+              <a:t>Eoin A. Moore – Historical NBA data</a:t>
+            </a:r>
+            <a:endParaRPr lang="hr-HR" dirty="0"/>
+          </a:p>
+          <a:p>
+            <a:r>
+              <a:rPr lang="hr-HR" b="1" dirty="0"/>
+              <a:t>Time </a:t>
+            </a:r>
+            <a:r>
+              <a:rPr lang="hr-HR" b="1" dirty="0" err="1"/>
+              <a:t>frame</a:t>
+            </a:r>
+            <a:r>
+              <a:rPr lang="hr-HR" b="1" dirty="0"/>
+              <a:t>:</a:t>
+            </a:r>
+            <a:r>
+              <a:rPr lang="hr-HR" dirty="0"/>
+              <a:t> 2005 – 2022</a:t>
+            </a:r>
+          </a:p>
+          <a:p>
+            <a:r>
+              <a:rPr lang="en-US" b="1" dirty="0"/>
+              <a:t>Data coverage:</a:t>
+            </a:r>
+            <a:endParaRPr lang="hr-HR" b="1" dirty="0"/>
+          </a:p>
+          <a:p>
+            <a:pPr lvl="1"/>
+            <a:r>
+              <a:rPr lang="en-US" dirty="0"/>
+              <a:t>Player statistics per game and season</a:t>
+            </a:r>
+          </a:p>
+          <a:p>
+            <a:pPr lvl="1"/>
+            <a:r>
+              <a:rPr lang="en-US" dirty="0"/>
+              <a:t>Team statistics and game results</a:t>
+            </a:r>
+          </a:p>
+          <a:p>
+            <a:pPr lvl="1"/>
+            <a:r>
+              <a:rPr lang="hr-HR" dirty="0" err="1"/>
+              <a:t>Trivia</a:t>
+            </a:r>
+            <a:r>
+              <a:rPr lang="hr-HR" dirty="0"/>
+              <a:t> </a:t>
+            </a:r>
+            <a:r>
+              <a:rPr lang="hr-HR" dirty="0" err="1"/>
+              <a:t>about</a:t>
+            </a:r>
+            <a:r>
+              <a:rPr lang="hr-HR" dirty="0"/>
+              <a:t> </a:t>
+            </a:r>
+            <a:r>
+              <a:rPr lang="hr-HR" dirty="0" err="1"/>
+              <a:t>teams</a:t>
+            </a:r>
+            <a:r>
+              <a:rPr lang="hr-HR" dirty="0"/>
+              <a:t> </a:t>
+            </a:r>
+            <a:r>
+              <a:rPr lang="hr-HR" dirty="0" err="1"/>
+              <a:t>and</a:t>
+            </a:r>
+            <a:r>
+              <a:rPr lang="hr-HR" dirty="0"/>
+              <a:t> </a:t>
+            </a:r>
+            <a:r>
+              <a:rPr lang="hr-HR" dirty="0" err="1"/>
+              <a:t>players</a:t>
+            </a:r>
+            <a:endParaRPr lang="en-US" dirty="0"/>
+          </a:p>
+          <a:p>
+            <a:endParaRPr lang="hr-HR" dirty="0"/>
+          </a:p>
+          <a:p>
+            <a:endParaRPr lang="hr-HR" dirty="0"/>
+          </a:p>
+          <a:p>
+            <a:pPr marL="0" indent="0">
+              <a:buNone/>
             </a:pPr>
-            <a:r>
-              <a:rPr lang="en-US" b="1" dirty="0">
-                <a:solidFill>
-                  <a:schemeClr val="tx1">
-                    <a:lumMod val="95000"/>
-                    <a:lumOff val="5000"/>
-                  </a:schemeClr>
-                </a:solidFill>
-              </a:rPr>
-              <a:t>Graph: team points trend</a:t>
-            </a:r>
+            <a:endParaRPr lang="hr-HR" dirty="0"/>
+          </a:p>
+          <a:p>
+            <a:endParaRPr lang="hr-HR" dirty="0"/>
           </a:p>
         </p:txBody>
       </p:sp>
       <p:pic>
         <p:nvPicPr>
-          <p:cNvPr id="14" name="Rezervirano mjesto sadržaja 13">
+          <p:cNvPr id="1026" name="Picture 2" descr="Kaggle Brand Guidelines">
             <a:extLst>
               <a:ext uri="{FF2B5EF4-FFF2-40B4-BE49-F238E27FC236}">
-                <a16:creationId xmlns:a16="http://schemas.microsoft.com/office/drawing/2014/main" id="{DB5972AA-615F-A9FA-0B52-C4BB448722F1}"/>
+                <a16:creationId xmlns:a16="http://schemas.microsoft.com/office/drawing/2014/main" id="{7EC60DB1-B733-607C-0B5D-149467AA342D}"/>
               </a:ext>
             </a:extLst>
           </p:cNvPr>
           <p:cNvPicPr>
-            <a:picLocks noGrp="1" noChangeAspect="1"/>
+            <a:picLocks noChangeAspect="1" noChangeArrowheads="1"/>
           </p:cNvPicPr>
-          <p:nvPr>
-            <p:ph idx="1"/>
-          </p:nvPr>
+          <p:nvPr/>
         </p:nvPicPr>
         <p:blipFill>
-          <a:blip r:embed="rId2"/>
+          <a:blip r:embed="rId4">
+            <a:extLst>
+              <a:ext uri="{28A0092B-C50C-407E-A947-70E740481C1C}">
+                <a14:useLocalDpi xmlns:a14="http://schemas.microsoft.com/office/drawing/2010/main" val="0"/>
+              </a:ext>
+            </a:extLst>
+          </a:blip>
+          <a:srcRect/>
           <a:stretch>
             <a:fillRect/>
           </a:stretch>
         </p:blipFill>
-        <p:spPr>
+        <p:spPr bwMode="auto">
           <a:xfrm>
-            <a:off x="670067" y="1068473"/>
-            <a:ext cx="10851865" cy="5526880"/>
-          </a:xfrm>
-          <a:prstGeom prst="rect">
-            <a:avLst/>
-          </a:prstGeom>
-        </p:spPr>
-      </p:pic>
-      <p:sp>
-        <p:nvSpPr>
-          <p:cNvPr id="5" name="TekstniOkvir 4">
-            <a:extLst>
-              <a:ext uri="{FF2B5EF4-FFF2-40B4-BE49-F238E27FC236}">
-                <a16:creationId xmlns:a16="http://schemas.microsoft.com/office/drawing/2014/main" id="{2869A6DB-AACD-B4A7-DDDF-0C9B88A658EE}"/>
-              </a:ext>
-            </a:extLst>
-          </p:cNvPr>
-          <p:cNvSpPr txBox="1"/>
-          <p:nvPr/>
-        </p:nvSpPr>
-        <p:spPr>
-          <a:xfrm>
-            <a:off x="591289" y="5038274"/>
-            <a:ext cx="7395120" cy="1200329"/>
+            <a:off x="6786041" y="1557353"/>
+            <a:ext cx="4567759" cy="2076254"/>
           </a:xfrm>
           <a:prstGeom prst="rect">
             <a:avLst/>
           </a:prstGeom>
           <a:noFill/>
+          <a:extLst>
+            <a:ext uri="{909E8E84-426E-40DD-AFC4-6F175D3DCCD1}">
+              <a14:hiddenFill xmlns:a14="http://schemas.microsoft.com/office/drawing/2010/main">
+                <a:solidFill>
+                  <a:srgbClr val="FFFFFF"/>
+                </a:solidFill>
+              </a14:hiddenFill>
+            </a:ext>
+          </a:extLst>
         </p:spPr>
-        <p:txBody>
-          <a:bodyPr wrap="square" rtlCol="0">
-            <a:spAutoFit/>
-          </a:bodyPr>
-          <a:lstStyle/>
-          <a:p>
-            <a:r>
-              <a:rPr lang="hr-HR" b="1" u="sng" dirty="0" err="1"/>
-              <a:t>Questions</a:t>
-            </a:r>
-            <a:r>
-              <a:rPr lang="hr-HR" dirty="0"/>
-              <a:t>:</a:t>
-            </a:r>
-          </a:p>
-          <a:p>
-            <a:pPr marL="342900" indent="-342900">
-              <a:buAutoNum type="arabicPeriod"/>
-            </a:pPr>
-            <a:r>
-              <a:rPr lang="hr-HR" dirty="0" err="1"/>
-              <a:t>Which</a:t>
-            </a:r>
-            <a:r>
-              <a:rPr lang="hr-HR" dirty="0"/>
-              <a:t> </a:t>
-            </a:r>
-            <a:r>
-              <a:rPr lang="hr-HR" dirty="0" err="1"/>
-              <a:t>team</a:t>
-            </a:r>
-            <a:r>
-              <a:rPr lang="hr-HR" dirty="0"/>
-              <a:t> </a:t>
-            </a:r>
-            <a:r>
-              <a:rPr lang="hr-HR" dirty="0" err="1"/>
-              <a:t>scored</a:t>
-            </a:r>
-            <a:r>
-              <a:rPr lang="hr-HR" dirty="0"/>
-              <a:t> more </a:t>
-            </a:r>
-            <a:r>
-              <a:rPr lang="hr-HR" dirty="0" err="1"/>
-              <a:t>points</a:t>
-            </a:r>
-            <a:r>
-              <a:rPr lang="hr-HR" dirty="0"/>
-              <a:t> on 21.4.2018 </a:t>
-            </a:r>
-            <a:r>
-              <a:rPr lang="hr-HR" dirty="0" err="1"/>
-              <a:t>in</a:t>
-            </a:r>
-            <a:r>
-              <a:rPr lang="hr-HR" dirty="0"/>
-              <a:t> </a:t>
-            </a:r>
-            <a:r>
-              <a:rPr lang="hr-HR" dirty="0" err="1"/>
-              <a:t>the</a:t>
-            </a:r>
-            <a:r>
-              <a:rPr lang="hr-HR" dirty="0"/>
-              <a:t> </a:t>
-            </a:r>
-            <a:r>
-              <a:rPr lang="hr-HR" dirty="0" err="1"/>
-              <a:t>second</a:t>
-            </a:r>
-            <a:r>
-              <a:rPr lang="hr-HR" dirty="0"/>
-              <a:t> </a:t>
-            </a:r>
-            <a:r>
-              <a:rPr lang="hr-HR" dirty="0" err="1"/>
-              <a:t>quarter</a:t>
-            </a:r>
-            <a:r>
-              <a:rPr lang="hr-HR" dirty="0"/>
-              <a:t>?</a:t>
-            </a:r>
-          </a:p>
-          <a:p>
-            <a:pPr marL="342900" indent="-342900">
-              <a:buAutoNum type="arabicPeriod"/>
-            </a:pPr>
-            <a:r>
-              <a:rPr lang="hr-HR" dirty="0"/>
-              <a:t>How </a:t>
-            </a:r>
-            <a:r>
-              <a:rPr lang="hr-HR" dirty="0" err="1"/>
-              <a:t>many</a:t>
-            </a:r>
-            <a:r>
-              <a:rPr lang="hr-HR" dirty="0"/>
-              <a:t> </a:t>
-            </a:r>
-            <a:r>
-              <a:rPr lang="hr-HR" dirty="0" err="1"/>
-              <a:t>times</a:t>
-            </a:r>
-            <a:r>
-              <a:rPr lang="hr-HR" dirty="0"/>
-              <a:t> </a:t>
-            </a:r>
-            <a:r>
-              <a:rPr lang="hr-HR" dirty="0" err="1"/>
-              <a:t>in</a:t>
-            </a:r>
-            <a:r>
-              <a:rPr lang="hr-HR" dirty="0"/>
-              <a:t> </a:t>
-            </a:r>
-            <a:r>
-              <a:rPr lang="hr-HR" dirty="0" err="1"/>
-              <a:t>the</a:t>
-            </a:r>
-            <a:r>
-              <a:rPr lang="hr-HR" dirty="0"/>
-              <a:t> </a:t>
-            </a:r>
-            <a:r>
-              <a:rPr lang="hr-HR" dirty="0" err="1"/>
-              <a:t>last</a:t>
-            </a:r>
-            <a:r>
-              <a:rPr lang="hr-HR" dirty="0"/>
-              <a:t> 10 </a:t>
-            </a:r>
-            <a:r>
-              <a:rPr lang="hr-HR" dirty="0" err="1"/>
-              <a:t>matches</a:t>
-            </a:r>
-            <a:r>
-              <a:rPr lang="hr-HR" dirty="0"/>
-              <a:t> </a:t>
-            </a:r>
-            <a:r>
-              <a:rPr lang="hr-HR" dirty="0" err="1"/>
-              <a:t>between</a:t>
-            </a:r>
-            <a:r>
-              <a:rPr lang="hr-HR" dirty="0"/>
-              <a:t> </a:t>
-            </a:r>
-            <a:r>
-              <a:rPr lang="hr-HR" dirty="0" err="1"/>
-              <a:t>team</a:t>
-            </a:r>
-            <a:r>
-              <a:rPr lang="hr-HR" dirty="0"/>
-              <a:t> A </a:t>
-            </a:r>
-            <a:r>
-              <a:rPr lang="hr-HR" dirty="0" err="1"/>
-              <a:t>and</a:t>
-            </a:r>
-            <a:r>
-              <a:rPr lang="hr-HR" dirty="0"/>
-              <a:t> </a:t>
-            </a:r>
-            <a:r>
-              <a:rPr lang="hr-HR" dirty="0" err="1"/>
-              <a:t>team</a:t>
-            </a:r>
-            <a:r>
-              <a:rPr lang="hr-HR" dirty="0"/>
-              <a:t> B </a:t>
-            </a:r>
-            <a:r>
-              <a:rPr lang="hr-HR" dirty="0" err="1"/>
-              <a:t>was</a:t>
-            </a:r>
-            <a:r>
-              <a:rPr lang="hr-HR" dirty="0"/>
-              <a:t> </a:t>
-            </a:r>
-            <a:r>
-              <a:rPr lang="hr-HR" dirty="0" err="1"/>
-              <a:t>the</a:t>
-            </a:r>
-            <a:r>
-              <a:rPr lang="hr-HR" dirty="0"/>
-              <a:t> </a:t>
-            </a:r>
-            <a:r>
-              <a:rPr lang="hr-HR" dirty="0" err="1"/>
-              <a:t>sum</a:t>
-            </a:r>
-            <a:r>
-              <a:rPr lang="hr-HR" dirty="0"/>
-              <a:t> </a:t>
-            </a:r>
-            <a:r>
-              <a:rPr lang="hr-HR" dirty="0" err="1"/>
-              <a:t>of</a:t>
-            </a:r>
-            <a:r>
-              <a:rPr lang="hr-HR" dirty="0"/>
-              <a:t> </a:t>
-            </a:r>
-            <a:r>
-              <a:rPr lang="hr-HR" dirty="0" err="1"/>
-              <a:t>points</a:t>
-            </a:r>
-            <a:r>
-              <a:rPr lang="hr-HR" dirty="0"/>
-              <a:t> </a:t>
-            </a:r>
-            <a:r>
-              <a:rPr lang="hr-HR" dirty="0" err="1"/>
-              <a:t>higher</a:t>
-            </a:r>
-            <a:r>
-              <a:rPr lang="hr-HR" dirty="0"/>
-              <a:t> </a:t>
-            </a:r>
-            <a:r>
-              <a:rPr lang="hr-HR" dirty="0" err="1"/>
-              <a:t>than</a:t>
-            </a:r>
-            <a:r>
-              <a:rPr lang="hr-HR" dirty="0"/>
-              <a:t> 240 </a:t>
-            </a:r>
-            <a:r>
-              <a:rPr lang="hr-HR" dirty="0" err="1"/>
-              <a:t>points</a:t>
-            </a:r>
-            <a:r>
-              <a:rPr lang="hr-HR" dirty="0"/>
-              <a:t>?</a:t>
-            </a:r>
-          </a:p>
-        </p:txBody>
-      </p:sp>
+      </p:pic>
       <p:pic>
         <p:nvPicPr>
-          <p:cNvPr id="15" name="Slika 14">
+          <p:cNvPr id="5" name="Slika 4">
             <a:extLst>
               <a:ext uri="{FF2B5EF4-FFF2-40B4-BE49-F238E27FC236}">
-                <a16:creationId xmlns:a16="http://schemas.microsoft.com/office/drawing/2014/main" id="{3C546FB9-DEF2-78C2-5819-887ACE862F0F}"/>
+                <a16:creationId xmlns:a16="http://schemas.microsoft.com/office/drawing/2014/main" id="{E2AEB241-9B67-A68E-8ACD-3C82F091CA41}"/>
               </a:ext>
             </a:extLst>
           </p:cNvPr>
@@ -5130,416 +5260,37 @@
           <p:nvPr/>
         </p:nvPicPr>
         <p:blipFill>
-          <a:blip r:embed="rId3"/>
+          <a:blip r:embed="rId5"/>
           <a:stretch>
             <a:fillRect/>
           </a:stretch>
         </p:blipFill>
         <p:spPr>
           <a:xfrm>
-            <a:off x="591289" y="1068473"/>
-            <a:ext cx="7792408" cy="3969801"/>
+            <a:off x="6218623" y="4558227"/>
+            <a:ext cx="5135177" cy="1753673"/>
           </a:xfrm>
           <a:prstGeom prst="rect">
             <a:avLst/>
           </a:prstGeom>
         </p:spPr>
       </p:pic>
-      <mc:AlternateContent xmlns:mc="http://schemas.openxmlformats.org/markup-compatibility/2006" xmlns:p14="http://schemas.microsoft.com/office/powerpoint/2010/main">
-        <mc:Choice Requires="p14">
-          <p:contentPart p14:bwMode="auto" r:id="rId4">
-            <p14:nvContentPartPr>
-              <p14:cNvPr id="3" name="Rukopis 2">
-                <a:extLst>
-                  <a:ext uri="{FF2B5EF4-FFF2-40B4-BE49-F238E27FC236}">
-                    <a16:creationId xmlns:a16="http://schemas.microsoft.com/office/drawing/2014/main" id="{08DBEE57-2B5C-895C-719C-206A54125DA9}"/>
-                  </a:ext>
-                </a:extLst>
-              </p14:cNvPr>
-              <p14:cNvContentPartPr/>
-              <p14:nvPr/>
-            </p14:nvContentPartPr>
-            <p14:xfrm>
-              <a:off x="1728720" y="4083120"/>
-              <a:ext cx="377640" cy="499680"/>
-            </p14:xfrm>
-          </p:contentPart>
-        </mc:Choice>
-        <mc:Fallback xmlns="">
-          <p:pic>
-            <p:nvPicPr>
-              <p:cNvPr id="3" name="Rukopis 2">
-                <a:extLst>
-                  <a:ext uri="{FF2B5EF4-FFF2-40B4-BE49-F238E27FC236}">
-                    <a16:creationId xmlns:a16="http://schemas.microsoft.com/office/drawing/2014/main" id="{08DBEE57-2B5C-895C-719C-206A54125DA9}"/>
-                  </a:ext>
-                </a:extLst>
-              </p:cNvPr>
-              <p:cNvPicPr/>
-              <p:nvPr/>
-            </p:nvPicPr>
-            <p:blipFill>
-              <a:blip r:embed="rId5"/>
-              <a:stretch>
-                <a:fillRect/>
-              </a:stretch>
-            </p:blipFill>
-            <p:spPr>
-              <a:xfrm>
-                <a:off x="1720080" y="4074120"/>
-                <a:ext cx="395280" cy="517320"/>
-              </a:xfrm>
-              <a:prstGeom prst="rect">
-                <a:avLst/>
-              </a:prstGeom>
-            </p:spPr>
-          </p:pic>
-        </mc:Fallback>
-      </mc:AlternateContent>
-      <mc:AlternateContent xmlns:mc="http://schemas.openxmlformats.org/markup-compatibility/2006" xmlns:p14="http://schemas.microsoft.com/office/powerpoint/2010/main">
-        <mc:Choice Requires="p14">
-          <p:contentPart p14:bwMode="auto" r:id="rId6">
-            <p14:nvContentPartPr>
-              <p14:cNvPr id="4" name="Rukopis 3">
-                <a:extLst>
-                  <a:ext uri="{FF2B5EF4-FFF2-40B4-BE49-F238E27FC236}">
-                    <a16:creationId xmlns:a16="http://schemas.microsoft.com/office/drawing/2014/main" id="{BCFB1BA7-463E-FDEA-0BCA-B2938E318B23}"/>
-                  </a:ext>
-                </a:extLst>
-              </p14:cNvPr>
-              <p14:cNvContentPartPr/>
-              <p14:nvPr/>
-            </p14:nvContentPartPr>
-            <p14:xfrm>
-              <a:off x="1341000" y="1996560"/>
-              <a:ext cx="761760" cy="564840"/>
-            </p14:xfrm>
-          </p:contentPart>
-        </mc:Choice>
-        <mc:Fallback xmlns="">
-          <p:pic>
-            <p:nvPicPr>
-              <p:cNvPr id="4" name="Rukopis 3">
-                <a:extLst>
-                  <a:ext uri="{FF2B5EF4-FFF2-40B4-BE49-F238E27FC236}">
-                    <a16:creationId xmlns:a16="http://schemas.microsoft.com/office/drawing/2014/main" id="{BCFB1BA7-463E-FDEA-0BCA-B2938E318B23}"/>
-                  </a:ext>
-                </a:extLst>
-              </p:cNvPr>
-              <p:cNvPicPr/>
-              <p:nvPr/>
-            </p:nvPicPr>
-            <p:blipFill>
-              <a:blip r:embed="rId7"/>
-              <a:stretch>
-                <a:fillRect/>
-              </a:stretch>
-            </p:blipFill>
-            <p:spPr>
-              <a:xfrm>
-                <a:off x="1332000" y="1987920"/>
-                <a:ext cx="779400" cy="582480"/>
-              </a:xfrm>
-              <a:prstGeom prst="rect">
-                <a:avLst/>
-              </a:prstGeom>
-            </p:spPr>
-          </p:pic>
-        </mc:Fallback>
-      </mc:AlternateContent>
-      <mc:AlternateContent xmlns:mc="http://schemas.openxmlformats.org/markup-compatibility/2006" xmlns:p14="http://schemas.microsoft.com/office/powerpoint/2010/main">
-        <mc:Choice Requires="p14">
-          <p:contentPart p14:bwMode="auto" r:id="rId8">
-            <p14:nvContentPartPr>
-              <p14:cNvPr id="6" name="Rukopis 5">
-                <a:extLst>
-                  <a:ext uri="{FF2B5EF4-FFF2-40B4-BE49-F238E27FC236}">
-                    <a16:creationId xmlns:a16="http://schemas.microsoft.com/office/drawing/2014/main" id="{3AFB62BE-8A19-7111-FF40-FD6661DD6081}"/>
-                  </a:ext>
-                </a:extLst>
-              </p14:cNvPr>
-              <p14:cNvContentPartPr/>
-              <p14:nvPr/>
-            </p14:nvContentPartPr>
-            <p14:xfrm>
-              <a:off x="1508400" y="3258360"/>
-              <a:ext cx="190800" cy="333720"/>
-            </p14:xfrm>
-          </p:contentPart>
-        </mc:Choice>
-        <mc:Fallback xmlns="">
-          <p:pic>
-            <p:nvPicPr>
-              <p:cNvPr id="6" name="Rukopis 5">
-                <a:extLst>
-                  <a:ext uri="{FF2B5EF4-FFF2-40B4-BE49-F238E27FC236}">
-                    <a16:creationId xmlns:a16="http://schemas.microsoft.com/office/drawing/2014/main" id="{3AFB62BE-8A19-7111-FF40-FD6661DD6081}"/>
-                  </a:ext>
-                </a:extLst>
-              </p:cNvPr>
-              <p:cNvPicPr/>
-              <p:nvPr/>
-            </p:nvPicPr>
-            <p:blipFill>
-              <a:blip r:embed="rId9"/>
-              <a:stretch>
-                <a:fillRect/>
-              </a:stretch>
-            </p:blipFill>
-            <p:spPr>
-              <a:xfrm>
-                <a:off x="1499400" y="3249720"/>
-                <a:ext cx="208440" cy="351360"/>
-              </a:xfrm>
-              <a:prstGeom prst="rect">
-                <a:avLst/>
-              </a:prstGeom>
-            </p:spPr>
-          </p:pic>
-        </mc:Fallback>
-      </mc:AlternateContent>
-      <mc:AlternateContent xmlns:mc="http://schemas.openxmlformats.org/markup-compatibility/2006" xmlns:p14="http://schemas.microsoft.com/office/powerpoint/2010/main">
-        <mc:Choice Requires="p14">
-          <p:contentPart p14:bwMode="auto" r:id="rId10">
-            <p14:nvContentPartPr>
-              <p14:cNvPr id="7" name="Rukopis 6">
-                <a:extLst>
-                  <a:ext uri="{FF2B5EF4-FFF2-40B4-BE49-F238E27FC236}">
-                    <a16:creationId xmlns:a16="http://schemas.microsoft.com/office/drawing/2014/main" id="{7616EFFA-7C57-BD96-0B80-ECDDEC38E07A}"/>
-                  </a:ext>
-                </a:extLst>
-              </p14:cNvPr>
-              <p14:cNvContentPartPr/>
-              <p14:nvPr/>
-            </p14:nvContentPartPr>
-            <p14:xfrm>
-              <a:off x="1317960" y="1186200"/>
-              <a:ext cx="259920" cy="456120"/>
-            </p14:xfrm>
-          </p:contentPart>
-        </mc:Choice>
-        <mc:Fallback xmlns="">
-          <p:pic>
-            <p:nvPicPr>
-              <p:cNvPr id="7" name="Rukopis 6">
-                <a:extLst>
-                  <a:ext uri="{FF2B5EF4-FFF2-40B4-BE49-F238E27FC236}">
-                    <a16:creationId xmlns:a16="http://schemas.microsoft.com/office/drawing/2014/main" id="{7616EFFA-7C57-BD96-0B80-ECDDEC38E07A}"/>
-                  </a:ext>
-                </a:extLst>
-              </p:cNvPr>
-              <p:cNvPicPr/>
-              <p:nvPr/>
-            </p:nvPicPr>
-            <p:blipFill>
-              <a:blip r:embed="rId11"/>
-              <a:stretch>
-                <a:fillRect/>
-              </a:stretch>
-            </p:blipFill>
-            <p:spPr>
-              <a:xfrm>
-                <a:off x="1308960" y="1177200"/>
-                <a:ext cx="277560" cy="473760"/>
-              </a:xfrm>
-              <a:prstGeom prst="rect">
-                <a:avLst/>
-              </a:prstGeom>
-            </p:spPr>
-          </p:pic>
-        </mc:Fallback>
-      </mc:AlternateContent>
-      <p:sp>
-        <p:nvSpPr>
-          <p:cNvPr id="8" name="TekstniOkvir 7">
-            <a:extLst>
-              <a:ext uri="{FF2B5EF4-FFF2-40B4-BE49-F238E27FC236}">
-                <a16:creationId xmlns:a16="http://schemas.microsoft.com/office/drawing/2014/main" id="{CC9F95BF-A3CF-5AB1-97D4-290FB7A53B70}"/>
-              </a:ext>
-            </a:extLst>
-          </p:cNvPr>
-          <p:cNvSpPr txBox="1"/>
-          <p:nvPr/>
-        </p:nvSpPr>
-        <p:spPr>
-          <a:xfrm>
-            <a:off x="289560" y="4610624"/>
-            <a:ext cx="5654040" cy="369332"/>
-          </a:xfrm>
-          <a:prstGeom prst="rect">
-            <a:avLst/>
-          </a:prstGeom>
-          <a:noFill/>
-        </p:spPr>
-        <p:txBody>
-          <a:bodyPr wrap="square" rtlCol="0">
-            <a:spAutoFit/>
-          </a:bodyPr>
-          <a:lstStyle/>
-          <a:p>
-            <a:r>
-              <a:rPr lang="hr-HR" dirty="0"/>
-              <a:t>DODAJ FILTER ZA STATISTIKU, u smislu sta ide na y os</a:t>
-            </a:r>
-          </a:p>
-        </p:txBody>
-      </p:sp>
     </p:spTree>
     <p:extLst>
       <p:ext uri="{BB962C8B-B14F-4D97-AF65-F5344CB8AC3E}">
-        <p14:creationId xmlns:p14="http://schemas.microsoft.com/office/powerpoint/2010/main" val="2052448907"/>
+        <p14:creationId xmlns:p14="http://schemas.microsoft.com/office/powerpoint/2010/main" val="3136251115"/>
       </p:ext>
     </p:extLst>
   </p:cSld>
   <p:clrMapOvr>
     <a:masterClrMapping/>
   </p:clrMapOvr>
-  <p:timing>
-    <p:tnLst>
-      <p:par>
-        <p:cTn id="1" dur="indefinite" restart="never" nodeType="tmRoot">
-          <p:childTnLst>
-            <p:seq concurrent="1" nextAc="seek">
-              <p:cTn id="2" dur="indefinite" nodeType="mainSeq">
-                <p:childTnLst>
-                  <p:par>
-                    <p:cTn id="3" fill="hold">
-                      <p:stCondLst>
-                        <p:cond delay="indefinite"/>
-                      </p:stCondLst>
-                      <p:childTnLst>
-                        <p:par>
-                          <p:cTn id="4" fill="hold">
-                            <p:stCondLst>
-                              <p:cond delay="0"/>
-                            </p:stCondLst>
-                            <p:childTnLst>
-                              <p:par>
-                                <p:cTn id="5" presetID="1" presetClass="exit" presetSubtype="0" fill="hold" nodeType="clickEffect">
-                                  <p:stCondLst>
-                                    <p:cond delay="0"/>
-                                  </p:stCondLst>
-                                  <p:childTnLst>
-                                    <p:set>
-                                      <p:cBhvr>
-                                        <p:cTn id="6" dur="1" fill="hold">
-                                          <p:stCondLst>
-                                            <p:cond delay="0"/>
-                                          </p:stCondLst>
-                                        </p:cTn>
-                                        <p:tgtEl>
-                                          <p:spTgt spid="14"/>
-                                        </p:tgtEl>
-                                        <p:attrNameLst>
-                                          <p:attrName>style.visibility</p:attrName>
-                                        </p:attrNameLst>
-                                      </p:cBhvr>
-                                      <p:to>
-                                        <p:strVal val="hidden"/>
-                                      </p:to>
-                                    </p:set>
-                                  </p:childTnLst>
-                                </p:cTn>
-                              </p:par>
-                              <p:par>
-                                <p:cTn id="7" presetID="1" presetClass="entr" presetSubtype="0" fill="hold" grpId="0" nodeType="withEffect">
-                                  <p:stCondLst>
-                                    <p:cond delay="0"/>
-                                  </p:stCondLst>
-                                  <p:childTnLst>
-                                    <p:set>
-                                      <p:cBhvr>
-                                        <p:cTn id="8" dur="1" fill="hold">
-                                          <p:stCondLst>
-                                            <p:cond delay="0"/>
-                                          </p:stCondLst>
-                                        </p:cTn>
-                                        <p:tgtEl>
-                                          <p:spTgt spid="5"/>
-                                        </p:tgtEl>
-                                        <p:attrNameLst>
-                                          <p:attrName>style.visibility</p:attrName>
-                                        </p:attrNameLst>
-                                      </p:cBhvr>
-                                      <p:to>
-                                        <p:strVal val="visible"/>
-                                      </p:to>
-                                    </p:set>
-                                  </p:childTnLst>
-                                </p:cTn>
-                              </p:par>
-                              <p:par>
-                                <p:cTn id="9" presetID="1" presetClass="entr" presetSubtype="0" fill="hold" nodeType="withEffect">
-                                  <p:stCondLst>
-                                    <p:cond delay="0"/>
-                                  </p:stCondLst>
-                                  <p:childTnLst>
-                                    <p:set>
-                                      <p:cBhvr>
-                                        <p:cTn id="10" dur="1" fill="hold">
-                                          <p:stCondLst>
-                                            <p:cond delay="0"/>
-                                          </p:stCondLst>
-                                        </p:cTn>
-                                        <p:tgtEl>
-                                          <p:spTgt spid="15"/>
-                                        </p:tgtEl>
-                                        <p:attrNameLst>
-                                          <p:attrName>style.visibility</p:attrName>
-                                        </p:attrNameLst>
-                                      </p:cBhvr>
-                                      <p:to>
-                                        <p:strVal val="visible"/>
-                                      </p:to>
-                                    </p:set>
-                                  </p:childTnLst>
-                                </p:cTn>
-                              </p:par>
-                            </p:childTnLst>
-                          </p:cTn>
-                        </p:par>
-                      </p:childTnLst>
-                    </p:cTn>
-                  </p:par>
-                </p:childTnLst>
-              </p:cTn>
-              <p:prevCondLst>
-                <p:cond evt="onPrev" delay="0">
-                  <p:tgtEl>
-                    <p:sldTgt/>
-                  </p:tgtEl>
-                </p:cond>
-              </p:prevCondLst>
-              <p:nextCondLst>
-                <p:cond evt="onNext" delay="0">
-                  <p:tgtEl>
-                    <p:sldTgt/>
-                  </p:tgtEl>
-                </p:cond>
-              </p:nextCondLst>
-            </p:seq>
-          </p:childTnLst>
-        </p:cTn>
-      </p:par>
-    </p:tnLst>
-    <p:bldLst>
-      <p:bldP spid="5" grpId="0"/>
-    </p:bldLst>
-  </p:timing>
 </p:sld>
 </file>
 
 <file path=ppt/slides/slide4.xml><?xml version="1.0" encoding="utf-8"?>
 <p:sld xmlns:a="http://schemas.openxmlformats.org/drawingml/2006/main" xmlns:r="http://schemas.openxmlformats.org/officeDocument/2006/relationships" xmlns:p="http://schemas.openxmlformats.org/presentationml/2006/main">
   <p:cSld>
-    <p:bg>
-      <p:bgPr>
-        <a:solidFill>
-          <a:schemeClr val="bg1"/>
-        </a:solidFill>
-        <a:effectLst/>
-      </p:bgPr>
-    </p:bg>
     <p:spTree>
       <p:nvGrpSpPr>
         <p:cNvPr id="1" name=""/>
@@ -5556,10 +5307,10 @@
       </p:grpSpPr>
       <p:sp>
         <p:nvSpPr>
-          <p:cNvPr id="2" name="Title 1">
+          <p:cNvPr id="2" name="Naslov 1">
             <a:extLst>
               <a:ext uri="{FF2B5EF4-FFF2-40B4-BE49-F238E27FC236}">
-                <a16:creationId xmlns:a16="http://schemas.microsoft.com/office/drawing/2014/main" id="{01423445-A650-3C3F-D74B-72BB5E3E6D44}"/>
+                <a16:creationId xmlns:a16="http://schemas.microsoft.com/office/drawing/2014/main" id="{F6437F11-E037-C22C-4385-7D6D373105A0}"/>
               </a:ext>
             </a:extLst>
           </p:cNvPr>
@@ -5570,47 +5321,33 @@
             <p:ph type="title"/>
           </p:nvPr>
         </p:nvSpPr>
-        <p:spPr>
-          <a:xfrm>
-            <a:off x="367553" y="387537"/>
-            <a:ext cx="10515600" cy="1325563"/>
-          </a:xfrm>
-        </p:spPr>
+        <p:spPr/>
         <p:txBody>
           <a:bodyPr/>
           <a:lstStyle/>
           <a:p>
             <a:r>
-              <a:rPr lang="en-US" b="1" dirty="0">
-                <a:solidFill>
-                  <a:schemeClr val="tx1">
-                    <a:lumMod val="95000"/>
-                    <a:lumOff val="5000"/>
-                  </a:schemeClr>
-                </a:solidFill>
-              </a:rPr>
-              <a:t>2.  Graph: player statistics</a:t>
-            </a:r>
-            <a:endParaRPr lang="en-US" dirty="0">
-              <a:solidFill>
-                <a:schemeClr val="tx1">
-                  <a:lumMod val="95000"/>
-                  <a:lumOff val="5000"/>
-                </a:schemeClr>
-              </a:solidFill>
-            </a:endParaRPr>
-          </a:p>
-          <a:p>
-            <a:endParaRPr lang="en-US" dirty="0"/>
-          </a:p>
-        </p:txBody>
-      </p:sp>
-      <p:sp>
-        <p:nvSpPr>
-          <p:cNvPr id="7" name="Rezervirano mjesto sadržaja 6">
+              <a:rPr lang="hr-HR" dirty="0" err="1"/>
+              <a:t>Tech</a:t>
+            </a:r>
+            <a:r>
+              <a:rPr lang="hr-HR" dirty="0"/>
+              <a:t> </a:t>
+            </a:r>
+            <a:r>
+              <a:rPr lang="hr-HR" dirty="0" err="1"/>
+              <a:t>Stack</a:t>
+            </a:r>
+            <a:endParaRPr lang="hr-HR" dirty="0"/>
+          </a:p>
+        </p:txBody>
+      </p:sp>
+      <p:sp>
+        <p:nvSpPr>
+          <p:cNvPr id="3" name="Rezervirano mjesto sadržaja 2">
             <a:extLst>
               <a:ext uri="{FF2B5EF4-FFF2-40B4-BE49-F238E27FC236}">
-                <a16:creationId xmlns:a16="http://schemas.microsoft.com/office/drawing/2014/main" id="{D3F9943E-440F-6CDC-F06E-382B1A94E552}"/>
+                <a16:creationId xmlns:a16="http://schemas.microsoft.com/office/drawing/2014/main" id="{A47ACFEF-F427-6E8B-00C3-CA18E1106E2A}"/>
               </a:ext>
             </a:extLst>
           </p:cNvPr>
@@ -5626,16 +5363,157 @@
           <a:bodyPr/>
           <a:lstStyle/>
           <a:p>
+            <a:r>
+              <a:rPr lang="hr-HR" b="1" dirty="0" err="1"/>
+              <a:t>Backend</a:t>
+            </a:r>
+            <a:r>
+              <a:rPr lang="hr-HR" b="1" dirty="0"/>
+              <a:t> / Data Processing:</a:t>
+            </a:r>
+          </a:p>
+          <a:p>
+            <a:pPr lvl="1"/>
+            <a:r>
+              <a:rPr lang="hr-HR" dirty="0"/>
+              <a:t>Python, </a:t>
+            </a:r>
+            <a:r>
+              <a:rPr lang="hr-HR" dirty="0" err="1"/>
+              <a:t>Pandas</a:t>
+            </a:r>
+            <a:r>
+              <a:rPr lang="hr-HR" dirty="0"/>
+              <a:t>, </a:t>
+            </a:r>
+            <a:r>
+              <a:rPr lang="hr-HR" dirty="0" err="1"/>
+              <a:t>FastApi</a:t>
+            </a:r>
+            <a:endParaRPr lang="hr-HR" dirty="0"/>
+          </a:p>
+          <a:p>
+            <a:pPr lvl="1"/>
+            <a:endParaRPr lang="hr-HR" dirty="0"/>
+          </a:p>
+          <a:p>
+            <a:r>
+              <a:rPr lang="hr-HR" b="1" dirty="0" err="1"/>
+              <a:t>Visualizations</a:t>
+            </a:r>
+            <a:r>
+              <a:rPr lang="hr-HR" b="1" dirty="0"/>
+              <a:t> / </a:t>
+            </a:r>
+            <a:r>
+              <a:rPr lang="hr-HR" b="1" dirty="0" err="1"/>
+              <a:t>Frontend</a:t>
+            </a:r>
+            <a:r>
+              <a:rPr lang="hr-HR" b="1" dirty="0"/>
+              <a:t>:</a:t>
+            </a:r>
+          </a:p>
+          <a:p>
+            <a:pPr lvl="1"/>
+            <a:r>
+              <a:rPr lang="hr-HR" dirty="0" err="1"/>
+              <a:t>React</a:t>
+            </a:r>
+            <a:r>
+              <a:rPr lang="hr-HR" dirty="0"/>
+              <a:t>, D3.js</a:t>
+            </a:r>
+          </a:p>
+          <a:p>
+            <a:pPr lvl="1"/>
+            <a:endParaRPr lang="hr-HR" dirty="0"/>
+          </a:p>
+          <a:p>
+            <a:r>
+              <a:rPr lang="hr-HR" b="1" dirty="0"/>
+              <a:t>Data </a:t>
+            </a:r>
+            <a:r>
+              <a:rPr lang="hr-HR" b="1" dirty="0" err="1"/>
+              <a:t>storage</a:t>
+            </a:r>
+            <a:r>
+              <a:rPr lang="hr-HR" b="1" dirty="0"/>
+              <a:t>:</a:t>
+            </a:r>
+          </a:p>
+          <a:p>
+            <a:pPr lvl="1"/>
+            <a:r>
+              <a:rPr lang="hr-HR" dirty="0" err="1"/>
+              <a:t>Supabase</a:t>
+            </a:r>
+            <a:endParaRPr lang="hr-HR" dirty="0"/>
+          </a:p>
+          <a:p>
+            <a:pPr lvl="1"/>
+            <a:endParaRPr lang="hr-HR" dirty="0"/>
+          </a:p>
+          <a:p>
+            <a:pPr lvl="1"/>
             <a:endParaRPr lang="hr-HR" dirty="0"/>
           </a:p>
         </p:txBody>
       </p:sp>
       <p:pic>
         <p:nvPicPr>
-          <p:cNvPr id="8" name="Slika 7">
+          <p:cNvPr id="2050" name="Picture 2">
             <a:extLst>
               <a:ext uri="{FF2B5EF4-FFF2-40B4-BE49-F238E27FC236}">
-                <a16:creationId xmlns:a16="http://schemas.microsoft.com/office/drawing/2014/main" id="{736C0CC1-9937-9EDA-FE6C-5599C2B20E4C}"/>
+                <a16:creationId xmlns:a16="http://schemas.microsoft.com/office/drawing/2014/main" id="{B982A166-6FDC-0A87-083F-43046013B53C}"/>
+              </a:ext>
+            </a:extLst>
+          </p:cNvPr>
+          <p:cNvPicPr>
+            <a:picLocks noChangeAspect="1" noChangeArrowheads="1"/>
+          </p:cNvPicPr>
+          <p:nvPr/>
+        </p:nvPicPr>
+        <p:blipFill>
+          <a:blip r:embed="rId2" cstate="print">
+            <a:extLst>
+              <a:ext uri="{28A0092B-C50C-407E-A947-70E740481C1C}">
+                <a14:useLocalDpi xmlns:a14="http://schemas.microsoft.com/office/drawing/2010/main" val="0"/>
+              </a:ext>
+            </a:extLst>
+          </a:blip>
+          <a:srcRect/>
+          <a:stretch>
+            <a:fillRect/>
+          </a:stretch>
+        </p:blipFill>
+        <p:spPr bwMode="auto">
+          <a:xfrm>
+            <a:off x="6096000" y="863825"/>
+            <a:ext cx="1206631" cy="1206631"/>
+          </a:xfrm>
+          <a:prstGeom prst="rect">
+            <a:avLst/>
+          </a:prstGeom>
+          <a:noFill/>
+          <a:extLst>
+            <a:ext uri="{909E8E84-426E-40DD-AFC4-6F175D3DCCD1}">
+              <a14:hiddenFill xmlns:a14="http://schemas.microsoft.com/office/drawing/2010/main">
+                <a:solidFill>
+                  <a:srgbClr val="FFFFFF"/>
+                </a:solidFill>
+              </a14:hiddenFill>
+            </a:ext>
+          </a:extLst>
+        </p:spPr>
+      </p:pic>
+      <p:pic>
+        <p:nvPicPr>
+          <p:cNvPr id="9" name="Grafika 8">
+            <a:extLst>
+              <a:ext uri="{FF2B5EF4-FFF2-40B4-BE49-F238E27FC236}">
+                <a16:creationId xmlns:a16="http://schemas.microsoft.com/office/drawing/2014/main" id="{83E6D07F-6167-7307-CDA7-15BBB5399992}"/>
               </a:ext>
             </a:extLst>
           </p:cNvPr>
@@ -5645,189 +5523,33 @@
           <p:nvPr/>
         </p:nvPicPr>
         <p:blipFill>
-          <a:blip r:embed="rId3"/>
+          <a:blip r:embed="rId3">
+            <a:extLst>
+              <a:ext uri="{96DAC541-7B7A-43D3-8B79-37D633B846F1}">
+                <asvg:svgBlip xmlns:asvg="http://schemas.microsoft.com/office/drawing/2016/SVG/main" r:embed="rId4"/>
+              </a:ext>
+            </a:extLst>
+          </a:blip>
           <a:stretch>
             <a:fillRect/>
           </a:stretch>
         </p:blipFill>
         <p:spPr>
           <a:xfrm>
-            <a:off x="838200" y="1063842"/>
-            <a:ext cx="9842770" cy="5775019"/>
+            <a:off x="8209814" y="502370"/>
+            <a:ext cx="2894961" cy="1170003"/>
           </a:xfrm>
           <a:prstGeom prst="rect">
             <a:avLst/>
           </a:prstGeom>
         </p:spPr>
       </p:pic>
-      <p:sp>
-        <p:nvSpPr>
-          <p:cNvPr id="5" name="TekstniOkvir 4">
+      <p:pic>
+        <p:nvPicPr>
+          <p:cNvPr id="11" name="Slika 10">
             <a:extLst>
               <a:ext uri="{FF2B5EF4-FFF2-40B4-BE49-F238E27FC236}">
-                <a16:creationId xmlns:a16="http://schemas.microsoft.com/office/drawing/2014/main" id="{2561E9BD-BCE2-8B4B-4B87-19079223184B}"/>
-              </a:ext>
-            </a:extLst>
-          </p:cNvPr>
-          <p:cNvSpPr txBox="1"/>
-          <p:nvPr/>
-        </p:nvSpPr>
-        <p:spPr>
-          <a:xfrm>
-            <a:off x="933855" y="4989122"/>
-            <a:ext cx="6916366" cy="1477328"/>
-          </a:xfrm>
-          <a:prstGeom prst="rect">
-            <a:avLst/>
-          </a:prstGeom>
-          <a:noFill/>
-        </p:spPr>
-        <p:txBody>
-          <a:bodyPr wrap="square" rtlCol="0">
-            <a:spAutoFit/>
-          </a:bodyPr>
-          <a:lstStyle/>
-          <a:p>
-            <a:r>
-              <a:rPr lang="hr-HR" b="1" u="sng" dirty="0" err="1"/>
-              <a:t>Questions</a:t>
-            </a:r>
-            <a:r>
-              <a:rPr lang="hr-HR" dirty="0"/>
-              <a:t>:</a:t>
-            </a:r>
-          </a:p>
-          <a:p>
-            <a:pPr marL="342900" indent="-342900">
-              <a:buAutoNum type="arabicPeriod"/>
-            </a:pPr>
-            <a:r>
-              <a:rPr lang="hr-HR" dirty="0"/>
-              <a:t>How </a:t>
-            </a:r>
-            <a:r>
-              <a:rPr lang="hr-HR" dirty="0" err="1"/>
-              <a:t>many</a:t>
-            </a:r>
-            <a:r>
-              <a:rPr lang="hr-HR" dirty="0"/>
-              <a:t> </a:t>
-            </a:r>
-            <a:r>
-              <a:rPr lang="hr-HR" dirty="0" err="1"/>
-              <a:t>players</a:t>
-            </a:r>
-            <a:r>
-              <a:rPr lang="hr-HR" dirty="0"/>
-              <a:t> </a:t>
-            </a:r>
-            <a:r>
-              <a:rPr lang="hr-HR" dirty="0" err="1"/>
-              <a:t>that</a:t>
-            </a:r>
-            <a:r>
-              <a:rPr lang="hr-HR" dirty="0"/>
-              <a:t> are </a:t>
-            </a:r>
-            <a:r>
-              <a:rPr lang="hr-HR" dirty="0" err="1"/>
-              <a:t>shown</a:t>
-            </a:r>
-            <a:r>
-              <a:rPr lang="hr-HR" dirty="0"/>
-              <a:t> on </a:t>
-            </a:r>
-            <a:r>
-              <a:rPr lang="hr-HR" dirty="0" err="1"/>
-              <a:t>the</a:t>
-            </a:r>
-            <a:r>
-              <a:rPr lang="hr-HR" dirty="0"/>
-              <a:t> </a:t>
-            </a:r>
-            <a:r>
-              <a:rPr lang="hr-HR" dirty="0" err="1"/>
-              <a:t>graph</a:t>
-            </a:r>
-            <a:r>
-              <a:rPr lang="hr-HR" dirty="0"/>
-              <a:t> had more </a:t>
-            </a:r>
-            <a:r>
-              <a:rPr lang="hr-HR" dirty="0" err="1"/>
-              <a:t>than</a:t>
-            </a:r>
-            <a:r>
-              <a:rPr lang="hr-HR" dirty="0"/>
-              <a:t> 6 </a:t>
-            </a:r>
-            <a:r>
-              <a:rPr lang="hr-HR" dirty="0" err="1"/>
-              <a:t>assists</a:t>
-            </a:r>
-            <a:r>
-              <a:rPr lang="hr-HR" dirty="0"/>
-              <a:t> </a:t>
-            </a:r>
-            <a:r>
-              <a:rPr lang="hr-HR" dirty="0" err="1"/>
-              <a:t>average</a:t>
-            </a:r>
-            <a:r>
-              <a:rPr lang="hr-HR" dirty="0"/>
-              <a:t> </a:t>
-            </a:r>
-            <a:r>
-              <a:rPr lang="hr-HR" dirty="0" err="1"/>
-              <a:t>in</a:t>
-            </a:r>
-            <a:r>
-              <a:rPr lang="hr-HR" dirty="0"/>
-              <a:t> </a:t>
-            </a:r>
-            <a:r>
-              <a:rPr lang="hr-HR" dirty="0" err="1"/>
-              <a:t>the</a:t>
-            </a:r>
-            <a:r>
-              <a:rPr lang="hr-HR" dirty="0"/>
-              <a:t> </a:t>
-            </a:r>
-            <a:r>
-              <a:rPr lang="hr-HR" dirty="0" err="1"/>
-              <a:t>last</a:t>
-            </a:r>
-            <a:r>
-              <a:rPr lang="hr-HR" dirty="0"/>
-              <a:t> </a:t>
-            </a:r>
-            <a:r>
-              <a:rPr lang="hr-HR" dirty="0" err="1"/>
-              <a:t>month</a:t>
-            </a:r>
-            <a:r>
-              <a:rPr lang="hr-HR" dirty="0"/>
-              <a:t>?</a:t>
-            </a:r>
-          </a:p>
-          <a:p>
-            <a:pPr marL="342900" indent="-342900">
-              <a:buAutoNum type="arabicPeriod"/>
-            </a:pPr>
-            <a:r>
-              <a:rPr lang="en-US" dirty="0"/>
-              <a:t>Which player shows the most balanced performance across all five categories?</a:t>
-            </a:r>
-            <a:endParaRPr lang="hr-HR" dirty="0"/>
-          </a:p>
-        </p:txBody>
-      </p:sp>
-      <p:pic>
-        <p:nvPicPr>
-          <p:cNvPr id="10" name="Slika 9">
-            <a:extLst>
-              <a:ext uri="{FF2B5EF4-FFF2-40B4-BE49-F238E27FC236}">
-                <a16:creationId xmlns:a16="http://schemas.microsoft.com/office/drawing/2014/main" id="{C1D9AD57-264A-3C8E-7436-E7F887DED0A9}"/>
+                <a16:creationId xmlns:a16="http://schemas.microsoft.com/office/drawing/2014/main" id="{E8B6F84E-6F25-EDEB-E41A-7EB0A381F44E}"/>
               </a:ext>
             </a:extLst>
           </p:cNvPr>
@@ -5837,511 +5559,145 @@
           <p:nvPr/>
         </p:nvPicPr>
         <p:blipFill>
-          <a:blip r:embed="rId4"/>
+          <a:blip r:embed="rId5" cstate="print">
+            <a:extLst>
+              <a:ext uri="{28A0092B-C50C-407E-A947-70E740481C1C}">
+                <a14:useLocalDpi xmlns:a14="http://schemas.microsoft.com/office/drawing/2010/main" val="0"/>
+              </a:ext>
+            </a:extLst>
+          </a:blip>
           <a:stretch>
             <a:fillRect/>
           </a:stretch>
         </p:blipFill>
         <p:spPr>
           <a:xfrm>
-            <a:off x="838200" y="1050318"/>
-            <a:ext cx="6604445" cy="3876090"/>
+            <a:off x="7682846" y="1807310"/>
+            <a:ext cx="3591274" cy="664386"/>
           </a:xfrm>
           <a:prstGeom prst="rect">
             <a:avLst/>
           </a:prstGeom>
         </p:spPr>
       </p:pic>
-      <p:grpSp>
-        <p:nvGrpSpPr>
-          <p:cNvPr id="12" name="Grupa 11">
+      <p:pic>
+        <p:nvPicPr>
+          <p:cNvPr id="13" name="Slika 12">
             <a:extLst>
               <a:ext uri="{FF2B5EF4-FFF2-40B4-BE49-F238E27FC236}">
-                <a16:creationId xmlns:a16="http://schemas.microsoft.com/office/drawing/2014/main" id="{32E14AD4-F882-621F-DD8E-6664DE3C101B}"/>
+                <a16:creationId xmlns:a16="http://schemas.microsoft.com/office/drawing/2014/main" id="{C85D46C8-F60F-7C48-CDBC-262CEFC18D93}"/>
               </a:ext>
             </a:extLst>
           </p:cNvPr>
-          <p:cNvGrpSpPr/>
+          <p:cNvPicPr>
+            <a:picLocks noChangeAspect="1"/>
+          </p:cNvPicPr>
           <p:nvPr/>
-        </p:nvGrpSpPr>
-        <p:grpSpPr>
+        </p:nvPicPr>
+        <p:blipFill>
+          <a:blip r:embed="rId6" cstate="print">
+            <a:extLst>
+              <a:ext uri="{28A0092B-C50C-407E-A947-70E740481C1C}">
+                <a14:useLocalDpi xmlns:a14="http://schemas.microsoft.com/office/drawing/2010/main" val="0"/>
+              </a:ext>
+            </a:extLst>
+          </a:blip>
+          <a:stretch>
+            <a:fillRect/>
+          </a:stretch>
+        </p:blipFill>
+        <p:spPr>
           <a:xfrm>
-            <a:off x="1069690" y="1065845"/>
-            <a:ext cx="1000080" cy="2556360"/>
-            <a:chOff x="1069690" y="1065845"/>
-            <a:chExt cx="1000080" cy="2556360"/>
+            <a:off x="8568602" y="3058702"/>
+            <a:ext cx="1819762" cy="1619588"/>
           </a:xfrm>
-        </p:grpSpPr>
-        <mc:AlternateContent xmlns:mc="http://schemas.openxmlformats.org/markup-compatibility/2006">
-          <mc:Choice xmlns:p14="http://schemas.microsoft.com/office/powerpoint/2010/main" Requires="p14">
-            <p:contentPart p14:bwMode="auto" r:id="rId5">
-              <p14:nvContentPartPr>
-                <p14:cNvPr id="3" name="Rukopis 2">
-                  <a:extLst>
-                    <a:ext uri="{FF2B5EF4-FFF2-40B4-BE49-F238E27FC236}">
-                      <a16:creationId xmlns:a16="http://schemas.microsoft.com/office/drawing/2014/main" id="{7CBBA3D4-A6FF-65FA-ADE2-DD2C176E739C}"/>
-                    </a:ext>
-                  </a:extLst>
-                </p14:cNvPr>
-                <p14:cNvContentPartPr/>
-                <p14:nvPr/>
-              </p14:nvContentPartPr>
-              <p14:xfrm>
-                <a:off x="1497730" y="1065845"/>
-                <a:ext cx="478080" cy="576360"/>
-              </p14:xfrm>
-            </p:contentPart>
-          </mc:Choice>
-          <mc:Fallback>
-            <p:pic>
-              <p:nvPicPr>
-                <p:cNvPr id="3" name="Rukopis 2">
-                  <a:extLst>
-                    <a:ext uri="{FF2B5EF4-FFF2-40B4-BE49-F238E27FC236}">
-                      <a16:creationId xmlns:a16="http://schemas.microsoft.com/office/drawing/2014/main" id="{7CBBA3D4-A6FF-65FA-ADE2-DD2C176E739C}"/>
-                    </a:ext>
-                  </a:extLst>
-                </p:cNvPr>
-                <p:cNvPicPr/>
-                <p:nvPr/>
-              </p:nvPicPr>
-              <p:blipFill>
-                <a:blip r:embed="rId6"/>
-                <a:stretch>
-                  <a:fillRect/>
-                </a:stretch>
-              </p:blipFill>
-              <p:spPr>
-                <a:xfrm>
-                  <a:off x="1489090" y="1057205"/>
-                  <a:ext cx="495720" cy="594000"/>
-                </a:xfrm>
-                <a:prstGeom prst="rect">
-                  <a:avLst/>
-                </a:prstGeom>
-              </p:spPr>
-            </p:pic>
-          </mc:Fallback>
-        </mc:AlternateContent>
-        <mc:AlternateContent xmlns:mc="http://schemas.openxmlformats.org/markup-compatibility/2006">
-          <mc:Choice xmlns:p14="http://schemas.microsoft.com/office/powerpoint/2010/main" Requires="p14">
-            <p:contentPart p14:bwMode="auto" r:id="rId7">
-              <p14:nvContentPartPr>
-                <p14:cNvPr id="4" name="Rukopis 3">
-                  <a:extLst>
-                    <a:ext uri="{FF2B5EF4-FFF2-40B4-BE49-F238E27FC236}">
-                      <a16:creationId xmlns:a16="http://schemas.microsoft.com/office/drawing/2014/main" id="{939DF303-61F4-D12D-B4F2-1084BDE67F1E}"/>
-                    </a:ext>
-                  </a:extLst>
-                </p14:cNvPr>
-                <p14:cNvContentPartPr/>
-                <p14:nvPr/>
-              </p14:nvContentPartPr>
-              <p14:xfrm>
-                <a:off x="1682770" y="1902485"/>
-                <a:ext cx="387000" cy="615960"/>
-              </p14:xfrm>
-            </p:contentPart>
-          </mc:Choice>
-          <mc:Fallback>
-            <p:pic>
-              <p:nvPicPr>
-                <p:cNvPr id="4" name="Rukopis 3">
-                  <a:extLst>
-                    <a:ext uri="{FF2B5EF4-FFF2-40B4-BE49-F238E27FC236}">
-                      <a16:creationId xmlns:a16="http://schemas.microsoft.com/office/drawing/2014/main" id="{939DF303-61F4-D12D-B4F2-1084BDE67F1E}"/>
-                    </a:ext>
-                  </a:extLst>
-                </p:cNvPr>
-                <p:cNvPicPr/>
-                <p:nvPr/>
-              </p:nvPicPr>
-              <p:blipFill>
-                <a:blip r:embed="rId8"/>
-                <a:stretch>
-                  <a:fillRect/>
-                </a:stretch>
-              </p:blipFill>
-              <p:spPr>
-                <a:xfrm>
-                  <a:off x="1673770" y="1893485"/>
-                  <a:ext cx="404640" cy="633600"/>
-                </a:xfrm>
-                <a:prstGeom prst="rect">
-                  <a:avLst/>
-                </a:prstGeom>
-              </p:spPr>
-            </p:pic>
-          </mc:Fallback>
-        </mc:AlternateContent>
-        <mc:AlternateContent xmlns:mc="http://schemas.openxmlformats.org/markup-compatibility/2006">
-          <mc:Choice xmlns:p14="http://schemas.microsoft.com/office/powerpoint/2010/main" Requires="p14">
-            <p:contentPart p14:bwMode="auto" r:id="rId9">
-              <p14:nvContentPartPr>
-                <p14:cNvPr id="6" name="Rukopis 5">
-                  <a:extLst>
-                    <a:ext uri="{FF2B5EF4-FFF2-40B4-BE49-F238E27FC236}">
-                      <a16:creationId xmlns:a16="http://schemas.microsoft.com/office/drawing/2014/main" id="{76992652-DCE6-5423-D91C-E4C6EF320916}"/>
-                    </a:ext>
-                  </a:extLst>
-                </p14:cNvPr>
-                <p14:cNvContentPartPr/>
-                <p14:nvPr/>
-              </p14:nvContentPartPr>
-              <p14:xfrm>
-                <a:off x="1069690" y="2054765"/>
-                <a:ext cx="382680" cy="668160"/>
-              </p14:xfrm>
-            </p:contentPart>
-          </mc:Choice>
-          <mc:Fallback>
-            <p:pic>
-              <p:nvPicPr>
-                <p:cNvPr id="6" name="Rukopis 5">
-                  <a:extLst>
-                    <a:ext uri="{FF2B5EF4-FFF2-40B4-BE49-F238E27FC236}">
-                      <a16:creationId xmlns:a16="http://schemas.microsoft.com/office/drawing/2014/main" id="{76992652-DCE6-5423-D91C-E4C6EF320916}"/>
-                    </a:ext>
-                  </a:extLst>
-                </p:cNvPr>
-                <p:cNvPicPr/>
-                <p:nvPr/>
-              </p:nvPicPr>
-              <p:blipFill>
-                <a:blip r:embed="rId10"/>
-                <a:stretch>
-                  <a:fillRect/>
-                </a:stretch>
-              </p:blipFill>
-              <p:spPr>
-                <a:xfrm>
-                  <a:off x="1060690" y="2046125"/>
-                  <a:ext cx="400320" cy="685800"/>
-                </a:xfrm>
-                <a:prstGeom prst="rect">
-                  <a:avLst/>
-                </a:prstGeom>
-              </p:spPr>
-            </p:pic>
-          </mc:Fallback>
-        </mc:AlternateContent>
-        <mc:AlternateContent xmlns:mc="http://schemas.openxmlformats.org/markup-compatibility/2006">
-          <mc:Choice xmlns:p14="http://schemas.microsoft.com/office/powerpoint/2010/main" Requires="p14">
-            <p:contentPart p14:bwMode="auto" r:id="rId11">
-              <p14:nvContentPartPr>
-                <p14:cNvPr id="11" name="Rukopis 10">
-                  <a:extLst>
-                    <a:ext uri="{FF2B5EF4-FFF2-40B4-BE49-F238E27FC236}">
-                      <a16:creationId xmlns:a16="http://schemas.microsoft.com/office/drawing/2014/main" id="{F74C1F07-50EF-D377-D69D-F48E27998A59}"/>
-                    </a:ext>
-                  </a:extLst>
-                </p14:cNvPr>
-                <p14:cNvContentPartPr/>
-                <p14:nvPr/>
-              </p14:nvContentPartPr>
-              <p14:xfrm>
-                <a:off x="1283890" y="2952245"/>
-                <a:ext cx="492840" cy="669960"/>
-              </p14:xfrm>
-            </p:contentPart>
-          </mc:Choice>
-          <mc:Fallback>
-            <p:pic>
-              <p:nvPicPr>
-                <p:cNvPr id="11" name="Rukopis 10">
-                  <a:extLst>
-                    <a:ext uri="{FF2B5EF4-FFF2-40B4-BE49-F238E27FC236}">
-                      <a16:creationId xmlns:a16="http://schemas.microsoft.com/office/drawing/2014/main" id="{F74C1F07-50EF-D377-D69D-F48E27998A59}"/>
-                    </a:ext>
-                  </a:extLst>
-                </p:cNvPr>
-                <p:cNvPicPr/>
-                <p:nvPr/>
-              </p:nvPicPr>
-              <p:blipFill>
-                <a:blip r:embed="rId12"/>
-                <a:stretch>
-                  <a:fillRect/>
-                </a:stretch>
-              </p:blipFill>
-              <p:spPr>
-                <a:xfrm>
-                  <a:off x="1274890" y="2943245"/>
-                  <a:ext cx="510480" cy="687600"/>
-                </a:xfrm>
-                <a:prstGeom prst="rect">
-                  <a:avLst/>
-                </a:prstGeom>
-              </p:spPr>
-            </p:pic>
-          </mc:Fallback>
-        </mc:AlternateContent>
-      </p:grpSp>
-      <p:grpSp>
-        <p:nvGrpSpPr>
-          <p:cNvPr id="15" name="Grupa 14">
+          <a:prstGeom prst="rect">
+            <a:avLst/>
+          </a:prstGeom>
+        </p:spPr>
+      </p:pic>
+      <p:pic>
+        <p:nvPicPr>
+          <p:cNvPr id="15" name="Slika 14">
             <a:extLst>
               <a:ext uri="{FF2B5EF4-FFF2-40B4-BE49-F238E27FC236}">
-                <a16:creationId xmlns:a16="http://schemas.microsoft.com/office/drawing/2014/main" id="{7CC34747-1B2A-6421-A02E-EEBDDD8BB00F}"/>
+                <a16:creationId xmlns:a16="http://schemas.microsoft.com/office/drawing/2014/main" id="{0E637EDC-30E2-7DA7-2266-B3D23DEB8498}"/>
               </a:ext>
             </a:extLst>
           </p:cNvPr>
-          <p:cNvGrpSpPr/>
+          <p:cNvPicPr>
+            <a:picLocks noChangeAspect="1"/>
+          </p:cNvPicPr>
           <p:nvPr/>
-        </p:nvGrpSpPr>
-        <p:grpSpPr>
+        </p:nvPicPr>
+        <p:blipFill>
+          <a:blip r:embed="rId7" cstate="print">
+            <a:extLst>
+              <a:ext uri="{28A0092B-C50C-407E-A947-70E740481C1C}">
+                <a14:useLocalDpi xmlns:a14="http://schemas.microsoft.com/office/drawing/2010/main" val="0"/>
+              </a:ext>
+            </a:extLst>
+          </a:blip>
+          <a:stretch>
+            <a:fillRect/>
+          </a:stretch>
+        </p:blipFill>
+        <p:spPr>
           <a:xfrm>
-            <a:off x="6789370" y="436205"/>
-            <a:ext cx="496440" cy="605520"/>
-            <a:chOff x="6789370" y="436205"/>
-            <a:chExt cx="496440" cy="605520"/>
+            <a:off x="6295030" y="3058702"/>
+            <a:ext cx="1819762" cy="1728774"/>
           </a:xfrm>
-        </p:grpSpPr>
-        <mc:AlternateContent xmlns:mc="http://schemas.openxmlformats.org/markup-compatibility/2006">
-          <mc:Choice xmlns:p14="http://schemas.microsoft.com/office/powerpoint/2010/main" Requires="p14">
-            <p:contentPart p14:bwMode="auto" r:id="rId13">
-              <p14:nvContentPartPr>
-                <p14:cNvPr id="13" name="Rukopis 12">
-                  <a:extLst>
-                    <a:ext uri="{FF2B5EF4-FFF2-40B4-BE49-F238E27FC236}">
-                      <a16:creationId xmlns:a16="http://schemas.microsoft.com/office/drawing/2014/main" id="{466BF5D5-8E84-F74C-2DB9-CAF9A9014DBD}"/>
-                    </a:ext>
-                  </a:extLst>
-                </p14:cNvPr>
-                <p14:cNvContentPartPr/>
-                <p14:nvPr/>
-              </p14:nvContentPartPr>
-              <p14:xfrm>
-                <a:off x="6789370" y="467165"/>
-                <a:ext cx="387720" cy="559440"/>
-              </p14:xfrm>
-            </p:contentPart>
-          </mc:Choice>
-          <mc:Fallback>
-            <p:pic>
-              <p:nvPicPr>
-                <p:cNvPr id="13" name="Rukopis 12">
-                  <a:extLst>
-                    <a:ext uri="{FF2B5EF4-FFF2-40B4-BE49-F238E27FC236}">
-                      <a16:creationId xmlns:a16="http://schemas.microsoft.com/office/drawing/2014/main" id="{466BF5D5-8E84-F74C-2DB9-CAF9A9014DBD}"/>
-                    </a:ext>
-                  </a:extLst>
-                </p:cNvPr>
-                <p:cNvPicPr/>
-                <p:nvPr/>
-              </p:nvPicPr>
-              <p:blipFill>
-                <a:blip r:embed="rId14"/>
-                <a:stretch>
-                  <a:fillRect/>
-                </a:stretch>
-              </p:blipFill>
-              <p:spPr>
-                <a:xfrm>
-                  <a:off x="6780730" y="458525"/>
-                  <a:ext cx="405360" cy="577080"/>
-                </a:xfrm>
-                <a:prstGeom prst="rect">
-                  <a:avLst/>
-                </a:prstGeom>
-              </p:spPr>
-            </p:pic>
-          </mc:Fallback>
-        </mc:AlternateContent>
-        <mc:AlternateContent xmlns:mc="http://schemas.openxmlformats.org/markup-compatibility/2006">
-          <mc:Choice xmlns:p14="http://schemas.microsoft.com/office/powerpoint/2010/main" Requires="p14">
-            <p:contentPart p14:bwMode="auto" r:id="rId15">
-              <p14:nvContentPartPr>
-                <p14:cNvPr id="14" name="Rukopis 13">
-                  <a:extLst>
-                    <a:ext uri="{FF2B5EF4-FFF2-40B4-BE49-F238E27FC236}">
-                      <a16:creationId xmlns:a16="http://schemas.microsoft.com/office/drawing/2014/main" id="{D1490D2D-27CE-DE4C-7B5B-F86CFBD2D4EE}"/>
-                    </a:ext>
-                  </a:extLst>
-                </p14:cNvPr>
-                <p14:cNvContentPartPr/>
-                <p14:nvPr/>
-              </p14:nvContentPartPr>
-              <p14:xfrm>
-                <a:off x="6915730" y="436205"/>
-                <a:ext cx="370080" cy="605520"/>
-              </p14:xfrm>
-            </p:contentPart>
-          </mc:Choice>
-          <mc:Fallback>
-            <p:pic>
-              <p:nvPicPr>
-                <p:cNvPr id="14" name="Rukopis 13">
-                  <a:extLst>
-                    <a:ext uri="{FF2B5EF4-FFF2-40B4-BE49-F238E27FC236}">
-                      <a16:creationId xmlns:a16="http://schemas.microsoft.com/office/drawing/2014/main" id="{D1490D2D-27CE-DE4C-7B5B-F86CFBD2D4EE}"/>
-                    </a:ext>
-                  </a:extLst>
-                </p:cNvPr>
-                <p:cNvPicPr/>
-                <p:nvPr/>
-              </p:nvPicPr>
-              <p:blipFill>
-                <a:blip r:embed="rId16"/>
-                <a:stretch>
-                  <a:fillRect/>
-                </a:stretch>
-              </p:blipFill>
-              <p:spPr>
-                <a:xfrm>
-                  <a:off x="6907090" y="427205"/>
-                  <a:ext cx="387720" cy="623160"/>
-                </a:xfrm>
-                <a:prstGeom prst="rect">
-                  <a:avLst/>
-                </a:prstGeom>
-              </p:spPr>
-            </p:pic>
-          </mc:Fallback>
-        </mc:AlternateContent>
-      </p:grpSp>
+          <a:prstGeom prst="rect">
+            <a:avLst/>
+          </a:prstGeom>
+        </p:spPr>
+      </p:pic>
+      <p:pic>
+        <p:nvPicPr>
+          <p:cNvPr id="17" name="Slika 16">
+            <a:extLst>
+              <a:ext uri="{FF2B5EF4-FFF2-40B4-BE49-F238E27FC236}">
+                <a16:creationId xmlns:a16="http://schemas.microsoft.com/office/drawing/2014/main" id="{BECA2DBA-B944-9D44-AB39-DCBCD2E1CBA4}"/>
+              </a:ext>
+            </a:extLst>
+          </p:cNvPr>
+          <p:cNvPicPr>
+            <a:picLocks noChangeAspect="1"/>
+          </p:cNvPicPr>
+          <p:nvPr/>
+        </p:nvPicPr>
+        <p:blipFill>
+          <a:blip r:embed="rId8" cstate="print">
+            <a:extLst>
+              <a:ext uri="{28A0092B-C50C-407E-A947-70E740481C1C}">
+                <a14:useLocalDpi xmlns:a14="http://schemas.microsoft.com/office/drawing/2010/main" val="0"/>
+              </a:ext>
+            </a:extLst>
+          </a:blip>
+          <a:stretch>
+            <a:fillRect/>
+          </a:stretch>
+        </p:blipFill>
+        <p:spPr>
+          <a:xfrm>
+            <a:off x="3912020" y="4431645"/>
+            <a:ext cx="1531463" cy="1531463"/>
+          </a:xfrm>
+          <a:prstGeom prst="rect">
+            <a:avLst/>
+          </a:prstGeom>
+        </p:spPr>
+      </p:pic>
     </p:spTree>
     <p:extLst>
       <p:ext uri="{BB962C8B-B14F-4D97-AF65-F5344CB8AC3E}">
-        <p14:creationId xmlns:p14="http://schemas.microsoft.com/office/powerpoint/2010/main" val="1133203939"/>
+        <p14:creationId xmlns:p14="http://schemas.microsoft.com/office/powerpoint/2010/main" val="475260177"/>
       </p:ext>
     </p:extLst>
   </p:cSld>
   <p:clrMapOvr>
     <a:masterClrMapping/>
   </p:clrMapOvr>
-  <p:timing>
-    <p:tnLst>
-      <p:par>
-        <p:cTn id="1" dur="indefinite" restart="never" nodeType="tmRoot">
-          <p:childTnLst>
-            <p:seq concurrent="1" nextAc="seek">
-              <p:cTn id="2" dur="indefinite" nodeType="mainSeq">
-                <p:childTnLst>
-                  <p:par>
-                    <p:cTn id="3" fill="hold">
-                      <p:stCondLst>
-                        <p:cond delay="indefinite"/>
-                      </p:stCondLst>
-                      <p:childTnLst>
-                        <p:par>
-                          <p:cTn id="4" fill="hold">
-                            <p:stCondLst>
-                              <p:cond delay="0"/>
-                            </p:stCondLst>
-                            <p:childTnLst>
-                              <p:par>
-                                <p:cTn id="5" presetID="1" presetClass="exit" presetSubtype="0" fill="hold" nodeType="clickEffect">
-                                  <p:stCondLst>
-                                    <p:cond delay="0"/>
-                                  </p:stCondLst>
-                                  <p:childTnLst>
-                                    <p:set>
-                                      <p:cBhvr>
-                                        <p:cTn id="6" dur="1" fill="hold">
-                                          <p:stCondLst>
-                                            <p:cond delay="0"/>
-                                          </p:stCondLst>
-                                        </p:cTn>
-                                        <p:tgtEl>
-                                          <p:spTgt spid="8"/>
-                                        </p:tgtEl>
-                                        <p:attrNameLst>
-                                          <p:attrName>style.visibility</p:attrName>
-                                        </p:attrNameLst>
-                                      </p:cBhvr>
-                                      <p:to>
-                                        <p:strVal val="hidden"/>
-                                      </p:to>
-                                    </p:set>
-                                  </p:childTnLst>
-                                </p:cTn>
-                              </p:par>
-                              <p:par>
-                                <p:cTn id="7" presetID="1" presetClass="entr" presetSubtype="0" fill="hold" nodeType="withEffect">
-                                  <p:stCondLst>
-                                    <p:cond delay="0"/>
-                                  </p:stCondLst>
-                                  <p:childTnLst>
-                                    <p:set>
-                                      <p:cBhvr>
-                                        <p:cTn id="8" dur="1" fill="hold">
-                                          <p:stCondLst>
-                                            <p:cond delay="0"/>
-                                          </p:stCondLst>
-                                        </p:cTn>
-                                        <p:tgtEl>
-                                          <p:spTgt spid="10"/>
-                                        </p:tgtEl>
-                                        <p:attrNameLst>
-                                          <p:attrName>style.visibility</p:attrName>
-                                        </p:attrNameLst>
-                                      </p:cBhvr>
-                                      <p:to>
-                                        <p:strVal val="visible"/>
-                                      </p:to>
-                                    </p:set>
-                                  </p:childTnLst>
-                                </p:cTn>
-                              </p:par>
-                              <p:par>
-                                <p:cTn id="9" presetID="1" presetClass="entr" presetSubtype="0" fill="hold" grpId="0" nodeType="withEffect">
-                                  <p:stCondLst>
-                                    <p:cond delay="0"/>
-                                  </p:stCondLst>
-                                  <p:childTnLst>
-                                    <p:set>
-                                      <p:cBhvr>
-                                        <p:cTn id="10" dur="1" fill="hold">
-                                          <p:stCondLst>
-                                            <p:cond delay="0"/>
-                                          </p:stCondLst>
-                                        </p:cTn>
-                                        <p:tgtEl>
-                                          <p:spTgt spid="5"/>
-                                        </p:tgtEl>
-                                        <p:attrNameLst>
-                                          <p:attrName>style.visibility</p:attrName>
-                                        </p:attrNameLst>
-                                      </p:cBhvr>
-                                      <p:to>
-                                        <p:strVal val="visible"/>
-                                      </p:to>
-                                    </p:set>
-                                  </p:childTnLst>
-                                </p:cTn>
-                              </p:par>
-                            </p:childTnLst>
-                          </p:cTn>
-                        </p:par>
-                      </p:childTnLst>
-                    </p:cTn>
-                  </p:par>
-                </p:childTnLst>
-              </p:cTn>
-              <p:prevCondLst>
-                <p:cond evt="onPrev" delay="0">
-                  <p:tgtEl>
-                    <p:sldTgt/>
-                  </p:tgtEl>
-                </p:cond>
-              </p:prevCondLst>
-              <p:nextCondLst>
-                <p:cond evt="onNext" delay="0">
-                  <p:tgtEl>
-                    <p:sldTgt/>
-                  </p:tgtEl>
-                </p:cond>
-              </p:nextCondLst>
-            </p:seq>
-          </p:childTnLst>
-        </p:cTn>
-      </p:par>
-    </p:tnLst>
-    <p:bldLst>
-      <p:bldP spid="5" grpId="0"/>
-    </p:bldLst>
-  </p:timing>
 </p:sld>
 </file>
 
@@ -6364,10 +5720,10 @@
       </p:grpSpPr>
       <p:sp>
         <p:nvSpPr>
-          <p:cNvPr id="2" name="Title 1">
+          <p:cNvPr id="2" name="Naslov 1">
             <a:extLst>
               <a:ext uri="{FF2B5EF4-FFF2-40B4-BE49-F238E27FC236}">
-                <a16:creationId xmlns:a16="http://schemas.microsoft.com/office/drawing/2014/main" id="{2CD4D9B6-71D1-6064-8306-7E99C8BF92EE}"/>
+                <a16:creationId xmlns:a16="http://schemas.microsoft.com/office/drawing/2014/main" id="{83A9225A-05CC-3265-A2FB-DFE120352041}"/>
               </a:ext>
             </a:extLst>
           </p:cNvPr>
@@ -6378,177 +5734,48 @@
             <p:ph type="title"/>
           </p:nvPr>
         </p:nvSpPr>
-        <p:spPr>
-          <a:xfrm>
-            <a:off x="401171" y="454772"/>
-            <a:ext cx="10829364" cy="1863446"/>
-          </a:xfrm>
-        </p:spPr>
+        <p:spPr/>
         <p:txBody>
           <a:bodyPr/>
           <a:lstStyle/>
           <a:p>
             <a:r>
-              <a:rPr lang="en-US" b="1" dirty="0">
-                <a:solidFill>
-                  <a:schemeClr val="tx1">
-                    <a:lumMod val="95000"/>
-                    <a:lumOff val="5000"/>
-                  </a:schemeClr>
-                </a:solidFill>
-              </a:rPr>
-              <a:t>3.  Graph: clutch factor</a:t>
-            </a:r>
-            <a:endParaRPr lang="en-US" dirty="0">
-              <a:solidFill>
-                <a:schemeClr val="tx1">
-                  <a:lumMod val="95000"/>
-                  <a:lumOff val="5000"/>
-                </a:schemeClr>
-              </a:solidFill>
-            </a:endParaRPr>
-          </a:p>
-          <a:p>
-            <a:endParaRPr lang="en-US" dirty="0"/>
-          </a:p>
-          <a:p>
-            <a:endParaRPr lang="en-US" dirty="0"/>
-          </a:p>
-        </p:txBody>
-      </p:sp>
-      <p:pic>
-        <p:nvPicPr>
-          <p:cNvPr id="6" name="Rezervirano mjesto sadržaja 5">
+              <a:rPr lang="hr-HR" dirty="0" err="1"/>
+              <a:t>User</a:t>
+            </a:r>
+            <a:r>
+              <a:rPr lang="hr-HR" dirty="0"/>
+              <a:t> </a:t>
+            </a:r>
+            <a:r>
+              <a:rPr lang="hr-HR" dirty="0" err="1"/>
+              <a:t>Personalization</a:t>
+            </a:r>
+            <a:endParaRPr lang="hr-HR" dirty="0"/>
+          </a:p>
+        </p:txBody>
+      </p:sp>
+      <p:sp>
+        <p:nvSpPr>
+          <p:cNvPr id="3" name="Rezervirano mjesto sadržaja 2">
             <a:extLst>
               <a:ext uri="{FF2B5EF4-FFF2-40B4-BE49-F238E27FC236}">
-                <a16:creationId xmlns:a16="http://schemas.microsoft.com/office/drawing/2014/main" id="{0D5BC977-9BF0-71EA-7F71-B4971877CF24}"/>
+                <a16:creationId xmlns:a16="http://schemas.microsoft.com/office/drawing/2014/main" id="{EC53A8DD-5907-5561-6BA6-503C45A9C39E}"/>
               </a:ext>
             </a:extLst>
           </p:cNvPr>
-          <p:cNvPicPr>
-            <a:picLocks noGrp="1" noChangeAspect="1"/>
-          </p:cNvPicPr>
+          <p:cNvSpPr>
+            <a:spLocks noGrp="1"/>
+          </p:cNvSpPr>
           <p:nvPr>
             <p:ph idx="1"/>
           </p:nvPr>
-        </p:nvPicPr>
-        <p:blipFill>
-          <a:blip r:embed="rId2"/>
-          <a:stretch>
-            <a:fillRect/>
-          </a:stretch>
-        </p:blipFill>
-        <p:spPr>
-          <a:xfrm>
-            <a:off x="490879" y="1134157"/>
-            <a:ext cx="11514693" cy="5603132"/>
-          </a:xfrm>
-          <a:prstGeom prst="rect">
-            <a:avLst/>
-          </a:prstGeom>
-        </p:spPr>
-      </p:pic>
-      <p:pic>
-        <p:nvPicPr>
-          <p:cNvPr id="7" name="Slika 6">
-            <a:extLst>
-              <a:ext uri="{FF2B5EF4-FFF2-40B4-BE49-F238E27FC236}">
-                <a16:creationId xmlns:a16="http://schemas.microsoft.com/office/drawing/2014/main" id="{DB5F3715-CA1E-6E36-D49E-094D74F707FE}"/>
-              </a:ext>
-            </a:extLst>
-          </p:cNvPr>
-          <p:cNvPicPr>
-            <a:picLocks noChangeAspect="1"/>
-          </p:cNvPicPr>
-          <p:nvPr/>
-        </p:nvPicPr>
-        <p:blipFill>
-          <a:blip r:embed="rId3"/>
-          <a:stretch>
-            <a:fillRect/>
-          </a:stretch>
-        </p:blipFill>
-        <p:spPr>
-          <a:xfrm>
-            <a:off x="619598" y="1113040"/>
-            <a:ext cx="8188634" cy="3984254"/>
-          </a:xfrm>
-          <a:prstGeom prst="rect">
-            <a:avLst/>
-          </a:prstGeom>
-        </p:spPr>
-      </p:pic>
-      <p:sp>
-        <p:nvSpPr>
-          <p:cNvPr id="8" name="TekstniOkvir 7">
-            <a:extLst>
-              <a:ext uri="{FF2B5EF4-FFF2-40B4-BE49-F238E27FC236}">
-                <a16:creationId xmlns:a16="http://schemas.microsoft.com/office/drawing/2014/main" id="{C2F4F130-E4D0-551A-15EA-4F3E7EEA7E2D}"/>
-              </a:ext>
-            </a:extLst>
-          </p:cNvPr>
-          <p:cNvSpPr txBox="1"/>
-          <p:nvPr/>
-        </p:nvSpPr>
-        <p:spPr>
-          <a:xfrm>
-            <a:off x="778213" y="5029200"/>
-            <a:ext cx="7694578" cy="1200329"/>
-          </a:xfrm>
-          <a:prstGeom prst="rect">
-            <a:avLst/>
-          </a:prstGeom>
-          <a:noFill/>
-        </p:spPr>
-        <p:txBody>
-          <a:bodyPr wrap="square" rtlCol="0">
-            <a:spAutoFit/>
-          </a:bodyPr>
-          <a:lstStyle/>
-          <a:p>
-            <a:r>
-              <a:rPr lang="hr-HR" b="1" u="sng" dirty="0" err="1"/>
-              <a:t>Questions</a:t>
-            </a:r>
-            <a:r>
-              <a:rPr lang="hr-HR" dirty="0"/>
-              <a:t>:</a:t>
-            </a:r>
-          </a:p>
-          <a:p>
-            <a:pPr marL="342900" indent="-342900">
-              <a:buAutoNum type="arabicPeriod"/>
-            </a:pPr>
-            <a:r>
-              <a:rPr lang="en-US" dirty="0"/>
-              <a:t>Which player has the highest win percentage in clutch games?</a:t>
-            </a:r>
-            <a:endParaRPr lang="hr-HR" dirty="0"/>
-          </a:p>
-          <a:p>
-            <a:pPr marL="342900" indent="-342900">
-              <a:buAutoNum type="arabicPeriod"/>
-            </a:pPr>
-            <a:r>
-              <a:rPr lang="en-US" dirty="0"/>
-              <a:t>Among players with more than 25 PPG in clutch games, who has the lowest </a:t>
-            </a:r>
-            <a:r>
-              <a:rPr lang="hr-HR" dirty="0" err="1"/>
-              <a:t>field</a:t>
-            </a:r>
-            <a:r>
-              <a:rPr lang="hr-HR" dirty="0"/>
-              <a:t> </a:t>
-            </a:r>
-            <a:r>
-              <a:rPr lang="hr-HR" dirty="0" err="1"/>
-              <a:t>goal</a:t>
-            </a:r>
-            <a:r>
-              <a:rPr lang="en-US" dirty="0"/>
-              <a:t> percentage?</a:t>
-            </a:r>
+        </p:nvSpPr>
+        <p:spPr/>
+        <p:txBody>
+          <a:bodyPr/>
+          <a:lstStyle/>
+          <a:p>
             <a:endParaRPr lang="hr-HR" dirty="0"/>
           </a:p>
         </p:txBody>
@@ -6556,145 +5783,397 @@
     </p:spTree>
     <p:extLst>
       <p:ext uri="{BB962C8B-B14F-4D97-AF65-F5344CB8AC3E}">
-        <p14:creationId xmlns:p14="http://schemas.microsoft.com/office/powerpoint/2010/main" val="4049340731"/>
+        <p14:creationId xmlns:p14="http://schemas.microsoft.com/office/powerpoint/2010/main" val="3939222018"/>
       </p:ext>
     </p:extLst>
   </p:cSld>
   <p:clrMapOvr>
     <a:masterClrMapping/>
   </p:clrMapOvr>
-  <p:timing>
-    <p:tnLst>
-      <p:par>
-        <p:cTn id="1" dur="indefinite" restart="never" nodeType="tmRoot">
-          <p:childTnLst>
-            <p:seq concurrent="1" nextAc="seek">
-              <p:cTn id="2" dur="indefinite" nodeType="mainSeq">
-                <p:childTnLst>
-                  <p:par>
-                    <p:cTn id="3" fill="hold">
-                      <p:stCondLst>
-                        <p:cond delay="indefinite"/>
-                      </p:stCondLst>
-                      <p:childTnLst>
-                        <p:par>
-                          <p:cTn id="4" fill="hold">
-                            <p:stCondLst>
-                              <p:cond delay="0"/>
-                            </p:stCondLst>
-                            <p:childTnLst>
-                              <p:par>
-                                <p:cTn id="5" presetID="1" presetClass="exit" presetSubtype="0" fill="hold" nodeType="clickEffect">
-                                  <p:stCondLst>
-                                    <p:cond delay="0"/>
-                                  </p:stCondLst>
-                                  <p:childTnLst>
-                                    <p:set>
-                                      <p:cBhvr>
-                                        <p:cTn id="6" dur="1" fill="hold">
-                                          <p:stCondLst>
-                                            <p:cond delay="0"/>
-                                          </p:stCondLst>
-                                        </p:cTn>
-                                        <p:tgtEl>
-                                          <p:spTgt spid="6"/>
-                                        </p:tgtEl>
-                                        <p:attrNameLst>
-                                          <p:attrName>style.visibility</p:attrName>
-                                        </p:attrNameLst>
-                                      </p:cBhvr>
-                                      <p:to>
-                                        <p:strVal val="hidden"/>
-                                      </p:to>
-                                    </p:set>
-                                  </p:childTnLst>
-                                </p:cTn>
-                              </p:par>
-                              <p:par>
-                                <p:cTn id="7" presetID="1" presetClass="entr" presetSubtype="0" fill="hold" nodeType="withEffect">
-                                  <p:stCondLst>
-                                    <p:cond delay="0"/>
-                                  </p:stCondLst>
-                                  <p:childTnLst>
-                                    <p:set>
-                                      <p:cBhvr>
-                                        <p:cTn id="8" dur="1" fill="hold">
-                                          <p:stCondLst>
-                                            <p:cond delay="0"/>
-                                          </p:stCondLst>
-                                        </p:cTn>
-                                        <p:tgtEl>
-                                          <p:spTgt spid="7"/>
-                                        </p:tgtEl>
-                                        <p:attrNameLst>
-                                          <p:attrName>style.visibility</p:attrName>
-                                        </p:attrNameLst>
-                                      </p:cBhvr>
-                                      <p:to>
-                                        <p:strVal val="visible"/>
-                                      </p:to>
-                                    </p:set>
-                                  </p:childTnLst>
-                                </p:cTn>
-                              </p:par>
-                              <p:par>
-                                <p:cTn id="9" presetID="1" presetClass="entr" presetSubtype="0" fill="hold" grpId="0" nodeType="withEffect">
-                                  <p:stCondLst>
-                                    <p:cond delay="0"/>
-                                  </p:stCondLst>
-                                  <p:childTnLst>
-                                    <p:set>
-                                      <p:cBhvr>
-                                        <p:cTn id="10" dur="1" fill="hold">
-                                          <p:stCondLst>
-                                            <p:cond delay="0"/>
-                                          </p:stCondLst>
-                                        </p:cTn>
-                                        <p:tgtEl>
-                                          <p:spTgt spid="8"/>
-                                        </p:tgtEl>
-                                        <p:attrNameLst>
-                                          <p:attrName>style.visibility</p:attrName>
-                                        </p:attrNameLst>
-                                      </p:cBhvr>
-                                      <p:to>
-                                        <p:strVal val="visible"/>
-                                      </p:to>
-                                    </p:set>
-                                  </p:childTnLst>
-                                </p:cTn>
-                              </p:par>
-                            </p:childTnLst>
-                          </p:cTn>
-                        </p:par>
-                      </p:childTnLst>
-                    </p:cTn>
-                  </p:par>
-                </p:childTnLst>
-              </p:cTn>
-              <p:prevCondLst>
-                <p:cond evt="onPrev" delay="0">
-                  <p:tgtEl>
-                    <p:sldTgt/>
-                  </p:tgtEl>
-                </p:cond>
-              </p:prevCondLst>
-              <p:nextCondLst>
-                <p:cond evt="onNext" delay="0">
-                  <p:tgtEl>
-                    <p:sldTgt/>
-                  </p:tgtEl>
-                </p:cond>
-              </p:nextCondLst>
-            </p:seq>
-          </p:childTnLst>
-        </p:cTn>
-      </p:par>
-    </p:tnLst>
-    <p:bldLst>
-      <p:bldP spid="8" grpId="0"/>
-    </p:bldLst>
-  </p:timing>
+</p:sld>
+</file>
+
+<file path=ppt/slides/slide6.xml><?xml version="1.0" encoding="utf-8"?>
+<p:sld xmlns:a="http://schemas.openxmlformats.org/drawingml/2006/main" xmlns:r="http://schemas.openxmlformats.org/officeDocument/2006/relationships" xmlns:p="http://schemas.openxmlformats.org/presentationml/2006/main">
+  <p:cSld>
+    <p:spTree>
+      <p:nvGrpSpPr>
+        <p:cNvPr id="1" name=""/>
+        <p:cNvGrpSpPr/>
+        <p:nvPr/>
+      </p:nvGrpSpPr>
+      <p:grpSpPr>
+        <a:xfrm>
+          <a:off x="0" y="0"/>
+          <a:ext cx="0" cy="0"/>
+          <a:chOff x="0" y="0"/>
+          <a:chExt cx="0" cy="0"/>
+        </a:xfrm>
+      </p:grpSpPr>
+      <p:sp>
+        <p:nvSpPr>
+          <p:cNvPr id="2" name="Naslov 1">
+            <a:extLst>
+              <a:ext uri="{FF2B5EF4-FFF2-40B4-BE49-F238E27FC236}">
+                <a16:creationId xmlns:a16="http://schemas.microsoft.com/office/drawing/2014/main" id="{65E0D5B8-782E-2AA0-D9DC-E3CBE2D2F2C9}"/>
+              </a:ext>
+            </a:extLst>
+          </p:cNvPr>
+          <p:cNvSpPr>
+            <a:spLocks noGrp="1"/>
+          </p:cNvSpPr>
+          <p:nvPr>
+            <p:ph type="title"/>
+          </p:nvPr>
+        </p:nvSpPr>
+        <p:spPr/>
+        <p:txBody>
+          <a:bodyPr/>
+          <a:lstStyle/>
+          <a:p>
+            <a:r>
+              <a:rPr lang="hr-HR" dirty="0" err="1"/>
+              <a:t>Main</a:t>
+            </a:r>
+            <a:r>
+              <a:rPr lang="hr-HR" dirty="0"/>
+              <a:t> </a:t>
+            </a:r>
+            <a:r>
+              <a:rPr lang="hr-HR" dirty="0" err="1"/>
+              <a:t>Dashboard</a:t>
+            </a:r>
+            <a:endParaRPr lang="hr-HR" dirty="0"/>
+          </a:p>
+        </p:txBody>
+      </p:sp>
+      <p:sp>
+        <p:nvSpPr>
+          <p:cNvPr id="3" name="Rezervirano mjesto sadržaja 2">
+            <a:extLst>
+              <a:ext uri="{FF2B5EF4-FFF2-40B4-BE49-F238E27FC236}">
+                <a16:creationId xmlns:a16="http://schemas.microsoft.com/office/drawing/2014/main" id="{7AA96F95-B9B9-EA99-9BFA-76A61D84A8C1}"/>
+              </a:ext>
+            </a:extLst>
+          </p:cNvPr>
+          <p:cNvSpPr>
+            <a:spLocks noGrp="1"/>
+          </p:cNvSpPr>
+          <p:nvPr>
+            <p:ph idx="1"/>
+          </p:nvPr>
+        </p:nvSpPr>
+        <p:spPr/>
+        <p:txBody>
+          <a:bodyPr/>
+          <a:lstStyle/>
+          <a:p>
+            <a:endParaRPr lang="hr-HR"/>
+          </a:p>
+        </p:txBody>
+      </p:sp>
+    </p:spTree>
+    <p:extLst>
+      <p:ext uri="{BB962C8B-B14F-4D97-AF65-F5344CB8AC3E}">
+        <p14:creationId xmlns:p14="http://schemas.microsoft.com/office/powerpoint/2010/main" val="1757616936"/>
+      </p:ext>
+    </p:extLst>
+  </p:cSld>
+  <p:clrMapOvr>
+    <a:masterClrMapping/>
+  </p:clrMapOvr>
+</p:sld>
+</file>
+
+<file path=ppt/slides/slide7.xml><?xml version="1.0" encoding="utf-8"?>
+<p:sld xmlns:a="http://schemas.openxmlformats.org/drawingml/2006/main" xmlns:r="http://schemas.openxmlformats.org/officeDocument/2006/relationships" xmlns:p="http://schemas.openxmlformats.org/presentationml/2006/main">
+  <p:cSld>
+    <p:spTree>
+      <p:nvGrpSpPr>
+        <p:cNvPr id="1" name=""/>
+        <p:cNvGrpSpPr/>
+        <p:nvPr/>
+      </p:nvGrpSpPr>
+      <p:grpSpPr>
+        <a:xfrm>
+          <a:off x="0" y="0"/>
+          <a:ext cx="0" cy="0"/>
+          <a:chOff x="0" y="0"/>
+          <a:chExt cx="0" cy="0"/>
+        </a:xfrm>
+      </p:grpSpPr>
+      <p:sp>
+        <p:nvSpPr>
+          <p:cNvPr id="2" name="Naslov 1">
+            <a:extLst>
+              <a:ext uri="{FF2B5EF4-FFF2-40B4-BE49-F238E27FC236}">
+                <a16:creationId xmlns:a16="http://schemas.microsoft.com/office/drawing/2014/main" id="{129075F6-9689-508C-D91C-12B24D25B5CE}"/>
+              </a:ext>
+            </a:extLst>
+          </p:cNvPr>
+          <p:cNvSpPr>
+            <a:spLocks noGrp="1"/>
+          </p:cNvSpPr>
+          <p:nvPr>
+            <p:ph type="title"/>
+          </p:nvPr>
+        </p:nvSpPr>
+        <p:spPr/>
+        <p:txBody>
+          <a:bodyPr/>
+          <a:lstStyle/>
+          <a:p>
+            <a:r>
+              <a:rPr lang="hr-HR" dirty="0" err="1"/>
+              <a:t>Graph</a:t>
+            </a:r>
+            <a:r>
+              <a:rPr lang="hr-HR" dirty="0"/>
+              <a:t> 1: Team </a:t>
+            </a:r>
+            <a:r>
+              <a:rPr lang="hr-HR" dirty="0" err="1"/>
+              <a:t>Matchup</a:t>
+            </a:r>
+            <a:r>
+              <a:rPr lang="hr-HR" dirty="0"/>
+              <a:t> </a:t>
+            </a:r>
+            <a:r>
+              <a:rPr lang="hr-HR" dirty="0" err="1"/>
+              <a:t>Trends</a:t>
+            </a:r>
+            <a:endParaRPr lang="hr-HR" dirty="0"/>
+          </a:p>
+        </p:txBody>
+      </p:sp>
+      <p:sp>
+        <p:nvSpPr>
+          <p:cNvPr id="3" name="Rezervirano mjesto sadržaja 2">
+            <a:extLst>
+              <a:ext uri="{FF2B5EF4-FFF2-40B4-BE49-F238E27FC236}">
+                <a16:creationId xmlns:a16="http://schemas.microsoft.com/office/drawing/2014/main" id="{A34F6188-3CD5-89BC-E923-2E8692D89235}"/>
+              </a:ext>
+            </a:extLst>
+          </p:cNvPr>
+          <p:cNvSpPr>
+            <a:spLocks noGrp="1"/>
+          </p:cNvSpPr>
+          <p:nvPr>
+            <p:ph idx="1"/>
+          </p:nvPr>
+        </p:nvSpPr>
+        <p:spPr/>
+        <p:txBody>
+          <a:bodyPr/>
+          <a:lstStyle/>
+          <a:p>
+            <a:endParaRPr lang="hr-HR" dirty="0"/>
+          </a:p>
+        </p:txBody>
+      </p:sp>
+    </p:spTree>
+    <p:extLst>
+      <p:ext uri="{BB962C8B-B14F-4D97-AF65-F5344CB8AC3E}">
+        <p14:creationId xmlns:p14="http://schemas.microsoft.com/office/powerpoint/2010/main" val="5822445"/>
+      </p:ext>
+    </p:extLst>
+  </p:cSld>
+  <p:clrMapOvr>
+    <a:masterClrMapping/>
+  </p:clrMapOvr>
+</p:sld>
+</file>
+
+<file path=ppt/slides/slide8.xml><?xml version="1.0" encoding="utf-8"?>
+<p:sld xmlns:a="http://schemas.openxmlformats.org/drawingml/2006/main" xmlns:r="http://schemas.openxmlformats.org/officeDocument/2006/relationships" xmlns:p="http://schemas.openxmlformats.org/presentationml/2006/main">
+  <p:cSld>
+    <p:spTree>
+      <p:nvGrpSpPr>
+        <p:cNvPr id="1" name=""/>
+        <p:cNvGrpSpPr/>
+        <p:nvPr/>
+      </p:nvGrpSpPr>
+      <p:grpSpPr>
+        <a:xfrm>
+          <a:off x="0" y="0"/>
+          <a:ext cx="0" cy="0"/>
+          <a:chOff x="0" y="0"/>
+          <a:chExt cx="0" cy="0"/>
+        </a:xfrm>
+      </p:grpSpPr>
+      <p:sp>
+        <p:nvSpPr>
+          <p:cNvPr id="2" name="Naslov 1">
+            <a:extLst>
+              <a:ext uri="{FF2B5EF4-FFF2-40B4-BE49-F238E27FC236}">
+                <a16:creationId xmlns:a16="http://schemas.microsoft.com/office/drawing/2014/main" id="{CF37A13D-F296-94E7-3F8F-DCC561683A34}"/>
+              </a:ext>
+            </a:extLst>
+          </p:cNvPr>
+          <p:cNvSpPr>
+            <a:spLocks noGrp="1"/>
+          </p:cNvSpPr>
+          <p:nvPr>
+            <p:ph type="title"/>
+          </p:nvPr>
+        </p:nvSpPr>
+        <p:spPr/>
+        <p:txBody>
+          <a:bodyPr/>
+          <a:lstStyle/>
+          <a:p>
+            <a:r>
+              <a:rPr lang="hr-HR" dirty="0" err="1"/>
+              <a:t>Graph</a:t>
+            </a:r>
+            <a:r>
+              <a:rPr lang="hr-HR" dirty="0"/>
+              <a:t> 2: Player </a:t>
+            </a:r>
+            <a:r>
+              <a:rPr lang="hr-HR" dirty="0" err="1"/>
+              <a:t>Comparison</a:t>
+            </a:r>
+            <a:endParaRPr lang="hr-HR" dirty="0"/>
+          </a:p>
+        </p:txBody>
+      </p:sp>
+      <p:sp>
+        <p:nvSpPr>
+          <p:cNvPr id="3" name="Rezervirano mjesto sadržaja 2">
+            <a:extLst>
+              <a:ext uri="{FF2B5EF4-FFF2-40B4-BE49-F238E27FC236}">
+                <a16:creationId xmlns:a16="http://schemas.microsoft.com/office/drawing/2014/main" id="{1DB33C2A-784B-926F-FE01-1241A1525F85}"/>
+              </a:ext>
+            </a:extLst>
+          </p:cNvPr>
+          <p:cNvSpPr>
+            <a:spLocks noGrp="1"/>
+          </p:cNvSpPr>
+          <p:nvPr>
+            <p:ph idx="1"/>
+          </p:nvPr>
+        </p:nvSpPr>
+        <p:spPr/>
+        <p:txBody>
+          <a:bodyPr/>
+          <a:lstStyle/>
+          <a:p>
+            <a:endParaRPr lang="hr-HR"/>
+          </a:p>
+        </p:txBody>
+      </p:sp>
+    </p:spTree>
+    <p:extLst>
+      <p:ext uri="{BB962C8B-B14F-4D97-AF65-F5344CB8AC3E}">
+        <p14:creationId xmlns:p14="http://schemas.microsoft.com/office/powerpoint/2010/main" val="1575064594"/>
+      </p:ext>
+    </p:extLst>
+  </p:cSld>
+  <p:clrMapOvr>
+    <a:masterClrMapping/>
+  </p:clrMapOvr>
+</p:sld>
+</file>
+
+<file path=ppt/slides/slide9.xml><?xml version="1.0" encoding="utf-8"?>
+<p:sld xmlns:a="http://schemas.openxmlformats.org/drawingml/2006/main" xmlns:r="http://schemas.openxmlformats.org/officeDocument/2006/relationships" xmlns:p="http://schemas.openxmlformats.org/presentationml/2006/main">
+  <p:cSld>
+    <p:spTree>
+      <p:nvGrpSpPr>
+        <p:cNvPr id="1" name=""/>
+        <p:cNvGrpSpPr/>
+        <p:nvPr/>
+      </p:nvGrpSpPr>
+      <p:grpSpPr>
+        <a:xfrm>
+          <a:off x="0" y="0"/>
+          <a:ext cx="0" cy="0"/>
+          <a:chOff x="0" y="0"/>
+          <a:chExt cx="0" cy="0"/>
+        </a:xfrm>
+      </p:grpSpPr>
+      <p:sp>
+        <p:nvSpPr>
+          <p:cNvPr id="2" name="Naslov 1">
+            <a:extLst>
+              <a:ext uri="{FF2B5EF4-FFF2-40B4-BE49-F238E27FC236}">
+                <a16:creationId xmlns:a16="http://schemas.microsoft.com/office/drawing/2014/main" id="{DD89A7C1-1349-5E04-D5DA-0218623730AA}"/>
+              </a:ext>
+            </a:extLst>
+          </p:cNvPr>
+          <p:cNvSpPr>
+            <a:spLocks noGrp="1"/>
+          </p:cNvSpPr>
+          <p:nvPr>
+            <p:ph type="title"/>
+          </p:nvPr>
+        </p:nvSpPr>
+        <p:spPr/>
+        <p:txBody>
+          <a:bodyPr/>
+          <a:lstStyle/>
+          <a:p>
+            <a:r>
+              <a:rPr lang="hr-HR" dirty="0" err="1"/>
+              <a:t>Graph</a:t>
+            </a:r>
+            <a:r>
+              <a:rPr lang="hr-HR" dirty="0"/>
+              <a:t> 3: </a:t>
+            </a:r>
+            <a:r>
+              <a:rPr lang="hr-HR" dirty="0" err="1"/>
+              <a:t>Clutch</a:t>
+            </a:r>
+            <a:r>
+              <a:rPr lang="hr-HR" dirty="0"/>
+              <a:t> </a:t>
+            </a:r>
+            <a:r>
+              <a:rPr lang="hr-HR" dirty="0" err="1"/>
+              <a:t>Factor</a:t>
+            </a:r>
+            <a:endParaRPr lang="hr-HR" dirty="0"/>
+          </a:p>
+        </p:txBody>
+      </p:sp>
+      <p:sp>
+        <p:nvSpPr>
+          <p:cNvPr id="3" name="Rezervirano mjesto sadržaja 2">
+            <a:extLst>
+              <a:ext uri="{FF2B5EF4-FFF2-40B4-BE49-F238E27FC236}">
+                <a16:creationId xmlns:a16="http://schemas.microsoft.com/office/drawing/2014/main" id="{58EE51D7-3542-9014-7263-CF23A05CC6AC}"/>
+              </a:ext>
+            </a:extLst>
+          </p:cNvPr>
+          <p:cNvSpPr>
+            <a:spLocks noGrp="1"/>
+          </p:cNvSpPr>
+          <p:nvPr>
+            <p:ph idx="1"/>
+          </p:nvPr>
+        </p:nvSpPr>
+        <p:spPr/>
+        <p:txBody>
+          <a:bodyPr/>
+          <a:lstStyle/>
+          <a:p>
+            <a:endParaRPr lang="hr-HR"/>
+          </a:p>
+        </p:txBody>
+      </p:sp>
+    </p:spTree>
+    <p:extLst>
+      <p:ext uri="{BB962C8B-B14F-4D97-AF65-F5344CB8AC3E}">
+        <p14:creationId xmlns:p14="http://schemas.microsoft.com/office/powerpoint/2010/main" val="1387637333"/>
+      </p:ext>
+    </p:extLst>
+  </p:cSld>
+  <p:clrMapOvr>
+    <a:masterClrMapping/>
+  </p:clrMapOvr>
 </p:sld>
 </file>
 

</xml_diff>